<commit_message>
updates to TLE section
</commit_message>
<xml_diff>
--- a/ML4SSA.pptx
+++ b/ML4SSA.pptx
@@ -5,21 +5,23 @@
     <p:sldMasterId id="2147483648" r:id="rId1"/>
   </p:sldMasterIdLst>
   <p:notesMasterIdLst>
-    <p:notesMasterId r:id="rId14"/>
+    <p:notesMasterId r:id="rId16"/>
   </p:notesMasterIdLst>
   <p:sldIdLst>
     <p:sldId id="256" r:id="rId2"/>
     <p:sldId id="257" r:id="rId3"/>
-    <p:sldId id="259" r:id="rId4"/>
-    <p:sldId id="263" r:id="rId5"/>
-    <p:sldId id="260" r:id="rId6"/>
-    <p:sldId id="261" r:id="rId7"/>
-    <p:sldId id="262" r:id="rId8"/>
-    <p:sldId id="265" r:id="rId9"/>
-    <p:sldId id="266" r:id="rId10"/>
-    <p:sldId id="264" r:id="rId11"/>
-    <p:sldId id="267" r:id="rId12"/>
-    <p:sldId id="268" r:id="rId13"/>
+    <p:sldId id="269" r:id="rId4"/>
+    <p:sldId id="259" r:id="rId5"/>
+    <p:sldId id="263" r:id="rId6"/>
+    <p:sldId id="260" r:id="rId7"/>
+    <p:sldId id="261" r:id="rId8"/>
+    <p:sldId id="262" r:id="rId9"/>
+    <p:sldId id="270" r:id="rId10"/>
+    <p:sldId id="265" r:id="rId11"/>
+    <p:sldId id="266" r:id="rId12"/>
+    <p:sldId id="264" r:id="rId13"/>
+    <p:sldId id="267" r:id="rId14"/>
+    <p:sldId id="268" r:id="rId15"/>
   </p:sldIdLst>
   <p:sldSz cx="12192000" cy="6858000"/>
   <p:notesSz cx="6858000" cy="9144000"/>
@@ -118,6 +120,14 @@
       </a:defRPr>
     </a:lvl9pPr>
   </p:defaultTextStyle>
+  <p:extLst>
+    <p:ext uri="{EFAFB233-063F-42B5-8137-9DF3F51BA10A}">
+      <p15:sldGuideLst xmlns:p15="http://schemas.microsoft.com/office/powerpoint/2012/main"/>
+    </p:ext>
+    <p:ext uri="{2D200454-40CA-4A62-9FC3-DE9A4176ACB9}">
+      <p15:notesGuideLst xmlns:p15="http://schemas.microsoft.com/office/powerpoint/2012/main"/>
+    </p:ext>
+  </p:extLst>
 </p:presentation>
 </file>
 
@@ -203,7 +213,7 @@
           <a:p>
             <a:fld id="{0386247E-E161-4A7D-8414-A680043B480C}" type="datetimeFigureOut">
               <a:rPr lang="en-US" smtClean="0"/>
-              <a:t>9/2/2018</a:t>
+              <a:t>9/6/2018</a:t>
             </a:fld>
             <a:endParaRPr lang="en-US"/>
           </a:p>
@@ -619,7 +629,7 @@
           <a:p>
             <a:fld id="{6957424D-6443-4BD4-B005-EE16AFA1F93E}" type="slidenum">
               <a:rPr lang="en-US" smtClean="0"/>
-              <a:t>3</a:t>
+              <a:t>4</a:t>
             </a:fld>
             <a:endParaRPr lang="en-US"/>
           </a:p>
@@ -703,7 +713,7 @@
           <a:p>
             <a:fld id="{6957424D-6443-4BD4-B005-EE16AFA1F93E}" type="slidenum">
               <a:rPr lang="en-US" smtClean="0"/>
-              <a:t>4</a:t>
+              <a:t>5</a:t>
             </a:fld>
             <a:endParaRPr lang="en-US"/>
           </a:p>
@@ -787,7 +797,7 @@
           <a:p>
             <a:fld id="{6957424D-6443-4BD4-B005-EE16AFA1F93E}" type="slidenum">
               <a:rPr lang="en-US" smtClean="0"/>
-              <a:t>5</a:t>
+              <a:t>6</a:t>
             </a:fld>
             <a:endParaRPr lang="en-US"/>
           </a:p>
@@ -874,7 +884,7 @@
           <a:p>
             <a:fld id="{6957424D-6443-4BD4-B005-EE16AFA1F93E}" type="slidenum">
               <a:rPr lang="en-US" smtClean="0"/>
-              <a:t>6</a:t>
+              <a:t>7</a:t>
             </a:fld>
             <a:endParaRPr lang="en-US"/>
           </a:p>
@@ -958,7 +968,7 @@
           <a:p>
             <a:fld id="{6957424D-6443-4BD4-B005-EE16AFA1F93E}" type="slidenum">
               <a:rPr lang="en-US" smtClean="0"/>
-              <a:t>7</a:t>
+              <a:t>8</a:t>
             </a:fld>
             <a:endParaRPr lang="en-US"/>
           </a:p>
@@ -1124,7 +1134,7 @@
           <a:p>
             <a:fld id="{71459950-B371-40CC-BAFD-4CFF20F72272}" type="datetimeFigureOut">
               <a:rPr lang="en-US" smtClean="0"/>
-              <a:t>9/2/2018</a:t>
+              <a:t>9/6/2018</a:t>
             </a:fld>
             <a:endParaRPr lang="en-US"/>
           </a:p>
@@ -1322,7 +1332,7 @@
           <a:p>
             <a:fld id="{71459950-B371-40CC-BAFD-4CFF20F72272}" type="datetimeFigureOut">
               <a:rPr lang="en-US" smtClean="0"/>
-              <a:t>9/2/2018</a:t>
+              <a:t>9/6/2018</a:t>
             </a:fld>
             <a:endParaRPr lang="en-US"/>
           </a:p>
@@ -1530,7 +1540,7 @@
           <a:p>
             <a:fld id="{71459950-B371-40CC-BAFD-4CFF20F72272}" type="datetimeFigureOut">
               <a:rPr lang="en-US" smtClean="0"/>
-              <a:t>9/2/2018</a:t>
+              <a:t>9/6/2018</a:t>
             </a:fld>
             <a:endParaRPr lang="en-US"/>
           </a:p>
@@ -1728,7 +1738,7 @@
           <a:p>
             <a:fld id="{71459950-B371-40CC-BAFD-4CFF20F72272}" type="datetimeFigureOut">
               <a:rPr lang="en-US" smtClean="0"/>
-              <a:t>9/2/2018</a:t>
+              <a:t>9/6/2018</a:t>
             </a:fld>
             <a:endParaRPr lang="en-US"/>
           </a:p>
@@ -2003,7 +2013,7 @@
           <a:p>
             <a:fld id="{71459950-B371-40CC-BAFD-4CFF20F72272}" type="datetimeFigureOut">
               <a:rPr lang="en-US" smtClean="0"/>
-              <a:t>9/2/2018</a:t>
+              <a:t>9/6/2018</a:t>
             </a:fld>
             <a:endParaRPr lang="en-US"/>
           </a:p>
@@ -2268,7 +2278,7 @@
           <a:p>
             <a:fld id="{71459950-B371-40CC-BAFD-4CFF20F72272}" type="datetimeFigureOut">
               <a:rPr lang="en-US" smtClean="0"/>
-              <a:t>9/2/2018</a:t>
+              <a:t>9/6/2018</a:t>
             </a:fld>
             <a:endParaRPr lang="en-US"/>
           </a:p>
@@ -2680,7 +2690,7 @@
           <a:p>
             <a:fld id="{71459950-B371-40CC-BAFD-4CFF20F72272}" type="datetimeFigureOut">
               <a:rPr lang="en-US" smtClean="0"/>
-              <a:t>9/2/2018</a:t>
+              <a:t>9/6/2018</a:t>
             </a:fld>
             <a:endParaRPr lang="en-US"/>
           </a:p>
@@ -2821,7 +2831,7 @@
           <a:p>
             <a:fld id="{71459950-B371-40CC-BAFD-4CFF20F72272}" type="datetimeFigureOut">
               <a:rPr lang="en-US" smtClean="0"/>
-              <a:t>9/2/2018</a:t>
+              <a:t>9/6/2018</a:t>
             </a:fld>
             <a:endParaRPr lang="en-US"/>
           </a:p>
@@ -2934,7 +2944,7 @@
           <a:p>
             <a:fld id="{71459950-B371-40CC-BAFD-4CFF20F72272}" type="datetimeFigureOut">
               <a:rPr lang="en-US" smtClean="0"/>
-              <a:t>9/2/2018</a:t>
+              <a:t>9/6/2018</a:t>
             </a:fld>
             <a:endParaRPr lang="en-US"/>
           </a:p>
@@ -3245,7 +3255,7 @@
           <a:p>
             <a:fld id="{71459950-B371-40CC-BAFD-4CFF20F72272}" type="datetimeFigureOut">
               <a:rPr lang="en-US" smtClean="0"/>
-              <a:t>9/2/2018</a:t>
+              <a:t>9/6/2018</a:t>
             </a:fld>
             <a:endParaRPr lang="en-US"/>
           </a:p>
@@ -3533,7 +3543,7 @@
           <a:p>
             <a:fld id="{71459950-B371-40CC-BAFD-4CFF20F72272}" type="datetimeFigureOut">
               <a:rPr lang="en-US" smtClean="0"/>
-              <a:t>9/2/2018</a:t>
+              <a:t>9/6/2018</a:t>
             </a:fld>
             <a:endParaRPr lang="en-US"/>
           </a:p>
@@ -3774,7 +3784,7 @@
           <a:p>
             <a:fld id="{71459950-B371-40CC-BAFD-4CFF20F72272}" type="datetimeFigureOut">
               <a:rPr lang="en-US" smtClean="0"/>
-              <a:t>9/2/2018</a:t>
+              <a:t>9/6/2018</a:t>
             </a:fld>
             <a:endParaRPr lang="en-US"/>
           </a:p>
@@ -4294,6 +4304,236 @@
           <a:chExt cx="0" cy="0"/>
         </a:xfrm>
       </p:grpSpPr>
+      <p:sp>
+        <p:nvSpPr>
+          <p:cNvPr id="2" name="Title 1">
+            <a:extLst>
+              <a:ext uri="{FF2B5EF4-FFF2-40B4-BE49-F238E27FC236}">
+                <a16:creationId xmlns:a16="http://schemas.microsoft.com/office/drawing/2014/main" id="{ECC9B202-80CE-4948-A80E-959B61F2A911}"/>
+              </a:ext>
+            </a:extLst>
+          </p:cNvPr>
+          <p:cNvSpPr>
+            <a:spLocks noGrp="1"/>
+          </p:cNvSpPr>
+          <p:nvPr>
+            <p:ph type="title"/>
+          </p:nvPr>
+        </p:nvSpPr>
+        <p:spPr/>
+        <p:txBody>
+          <a:bodyPr/>
+          <a:lstStyle/>
+          <a:p>
+            <a:r>
+              <a:rPr lang="en-US" dirty="0"/>
+              <a:t>Classification</a:t>
+            </a:r>
+          </a:p>
+        </p:txBody>
+      </p:sp>
+      <p:sp>
+        <p:nvSpPr>
+          <p:cNvPr id="3" name="Content Placeholder 2">
+            <a:extLst>
+              <a:ext uri="{FF2B5EF4-FFF2-40B4-BE49-F238E27FC236}">
+                <a16:creationId xmlns:a16="http://schemas.microsoft.com/office/drawing/2014/main" id="{73C5B286-A9F0-4B3E-8095-CAE1E58B7090}"/>
+              </a:ext>
+            </a:extLst>
+          </p:cNvPr>
+          <p:cNvSpPr>
+            <a:spLocks noGrp="1"/>
+          </p:cNvSpPr>
+          <p:nvPr>
+            <p:ph idx="1"/>
+          </p:nvPr>
+        </p:nvSpPr>
+        <p:spPr/>
+        <p:txBody>
+          <a:bodyPr>
+            <a:normAutofit fontScale="70000" lnSpcReduction="20000"/>
+          </a:bodyPr>
+          <a:lstStyle/>
+          <a:p>
+            <a:pPr marL="0" indent="0">
+              <a:buNone/>
+            </a:pPr>
+            <a:r>
+              <a:rPr lang="en-US" dirty="0"/>
+              <a:t>Rules of Thumb:</a:t>
+            </a:r>
+          </a:p>
+          <a:p>
+            <a:r>
+              <a:rPr lang="en-US" dirty="0"/>
+              <a:t>Avoid hand-selected/engineered features (at least initially)</a:t>
+            </a:r>
+          </a:p>
+          <a:p>
+            <a:r>
+              <a:rPr lang="en-US" dirty="0"/>
+              <a:t>Split train/test data based on some deterministic criteria</a:t>
+            </a:r>
+          </a:p>
+          <a:p>
+            <a:pPr lvl="1"/>
+            <a:r>
+              <a:rPr lang="en-US" dirty="0"/>
+              <a:t>For example, test samples are precisely those for which SAT_ID % 5 == 0. This helps to avoid accidently letting the same or equivalent examples fall into your train and test sets.</a:t>
+            </a:r>
+          </a:p>
+          <a:p>
+            <a:r>
+              <a:rPr lang="en-US" dirty="0"/>
+              <a:t>Be very careful with metrics and class imbalance.</a:t>
+            </a:r>
+          </a:p>
+          <a:p>
+            <a:pPr lvl="1"/>
+            <a:r>
+              <a:rPr lang="en-US" dirty="0"/>
+              <a:t>For example, if 95% of your data belongs to the same class, reporting a 96% accuracy needs some qualifications.</a:t>
+            </a:r>
+          </a:p>
+          <a:p>
+            <a:r>
+              <a:rPr lang="en-US" dirty="0"/>
+              <a:t>Identify a single-number metric to help simplify model comparisons.</a:t>
+            </a:r>
+          </a:p>
+          <a:p>
+            <a:r>
+              <a:rPr lang="en-US" dirty="0"/>
+              <a:t>Normalize your feature data.</a:t>
+            </a:r>
+          </a:p>
+          <a:p>
+            <a:r>
+              <a:rPr lang="en-US" dirty="0"/>
+              <a:t>Focus on the simplest version of a problem first and avoid extensive hyperparameter optimization until you can demonstrate that the most basic thing is working.</a:t>
+            </a:r>
+          </a:p>
+          <a:p>
+            <a:r>
+              <a:rPr lang="en-US" dirty="0"/>
+              <a:t>Make sure the model is learning the training data before even worrying about the test data. If your model can’t even memorize the training data well, either your problem is going to work or something else is broken.</a:t>
+            </a:r>
+          </a:p>
+        </p:txBody>
+      </p:sp>
+    </p:spTree>
+    <p:extLst>
+      <p:ext uri="{BB962C8B-B14F-4D97-AF65-F5344CB8AC3E}">
+        <p14:creationId xmlns:p14="http://schemas.microsoft.com/office/powerpoint/2010/main" val="1812924170"/>
+      </p:ext>
+    </p:extLst>
+  </p:cSld>
+  <p:clrMapOvr>
+    <a:masterClrMapping/>
+  </p:clrMapOvr>
+</p:sld>
+</file>
+
+<file path=ppt/slides/slide11.xml><?xml version="1.0" encoding="utf-8"?>
+<p:sld xmlns:a="http://schemas.openxmlformats.org/drawingml/2006/main" xmlns:r="http://schemas.openxmlformats.org/officeDocument/2006/relationships" xmlns:p="http://schemas.openxmlformats.org/presentationml/2006/main">
+  <p:cSld>
+    <p:spTree>
+      <p:nvGrpSpPr>
+        <p:cNvPr id="1" name=""/>
+        <p:cNvGrpSpPr/>
+        <p:nvPr/>
+      </p:nvGrpSpPr>
+      <p:grpSpPr>
+        <a:xfrm>
+          <a:off x="0" y="0"/>
+          <a:ext cx="0" cy="0"/>
+          <a:chOff x="0" y="0"/>
+          <a:chExt cx="0" cy="0"/>
+        </a:xfrm>
+      </p:grpSpPr>
+      <p:sp>
+        <p:nvSpPr>
+          <p:cNvPr id="2" name="Title 1">
+            <a:extLst>
+              <a:ext uri="{FF2B5EF4-FFF2-40B4-BE49-F238E27FC236}">
+                <a16:creationId xmlns:a16="http://schemas.microsoft.com/office/drawing/2014/main" id="{0E22603D-14F1-4117-A473-59E0C22862C3}"/>
+              </a:ext>
+            </a:extLst>
+          </p:cNvPr>
+          <p:cNvSpPr>
+            <a:spLocks noGrp="1"/>
+          </p:cNvSpPr>
+          <p:nvPr>
+            <p:ph type="title"/>
+          </p:nvPr>
+        </p:nvSpPr>
+        <p:spPr/>
+        <p:txBody>
+          <a:bodyPr/>
+          <a:lstStyle/>
+          <a:p>
+            <a:r>
+              <a:rPr lang="en-US" dirty="0"/>
+              <a:t>Convolutional Neural Networks</a:t>
+            </a:r>
+          </a:p>
+        </p:txBody>
+      </p:sp>
+      <p:sp>
+        <p:nvSpPr>
+          <p:cNvPr id="5" name="Text Placeholder 4">
+            <a:extLst>
+              <a:ext uri="{FF2B5EF4-FFF2-40B4-BE49-F238E27FC236}">
+                <a16:creationId xmlns:a16="http://schemas.microsoft.com/office/drawing/2014/main" id="{ABC9E725-B1B7-45D9-9C9A-5C7785D16D7B}"/>
+              </a:ext>
+            </a:extLst>
+          </p:cNvPr>
+          <p:cNvSpPr>
+            <a:spLocks noGrp="1"/>
+          </p:cNvSpPr>
+          <p:nvPr>
+            <p:ph type="body" idx="1"/>
+          </p:nvPr>
+        </p:nvSpPr>
+        <p:spPr/>
+        <p:txBody>
+          <a:bodyPr/>
+          <a:lstStyle/>
+          <a:p>
+            <a:endParaRPr lang="en-US"/>
+          </a:p>
+        </p:txBody>
+      </p:sp>
+    </p:spTree>
+    <p:extLst>
+      <p:ext uri="{BB962C8B-B14F-4D97-AF65-F5344CB8AC3E}">
+        <p14:creationId xmlns:p14="http://schemas.microsoft.com/office/powerpoint/2010/main" val="4180393728"/>
+      </p:ext>
+    </p:extLst>
+  </p:cSld>
+  <p:clrMapOvr>
+    <a:masterClrMapping/>
+  </p:clrMapOvr>
+</p:sld>
+</file>
+
+<file path=ppt/slides/slide12.xml><?xml version="1.0" encoding="utf-8"?>
+<p:sld xmlns:a="http://schemas.openxmlformats.org/drawingml/2006/main" xmlns:r="http://schemas.openxmlformats.org/officeDocument/2006/relationships" xmlns:p="http://schemas.openxmlformats.org/presentationml/2006/main">
+  <p:cSld>
+    <p:spTree>
+      <p:nvGrpSpPr>
+        <p:cNvPr id="1" name=""/>
+        <p:cNvGrpSpPr/>
+        <p:nvPr/>
+      </p:nvGrpSpPr>
+      <p:grpSpPr>
+        <a:xfrm>
+          <a:off x="0" y="0"/>
+          <a:ext cx="0" cy="0"/>
+          <a:chOff x="0" y="0"/>
+          <a:chExt cx="0" cy="0"/>
+        </a:xfrm>
+      </p:grpSpPr>
       <p:pic>
         <p:nvPicPr>
           <p:cNvPr id="9" name="Content Placeholder 8" descr="A picture containing tree&#10;&#10;Description generated with very high confidence">
@@ -4385,7 +4625,7 @@
 </p:sld>
 </file>
 
-<file path=ppt/slides/slide11.xml><?xml version="1.0" encoding="utf-8"?>
+<file path=ppt/slides/slide13.xml><?xml version="1.0" encoding="utf-8"?>
 <p:sld xmlns:a="http://schemas.openxmlformats.org/drawingml/2006/main" xmlns:r="http://schemas.openxmlformats.org/officeDocument/2006/relationships" xmlns:p="http://schemas.openxmlformats.org/presentationml/2006/main">
   <p:cSld>
     <p:spTree>
@@ -4511,7 +4751,7 @@
 </p:sld>
 </file>
 
-<file path=ppt/slides/slide12.xml><?xml version="1.0" encoding="utf-8"?>
+<file path=ppt/slides/slide14.xml><?xml version="1.0" encoding="utf-8"?>
 <p:sld xmlns:a="http://schemas.openxmlformats.org/drawingml/2006/main" xmlns:r="http://schemas.openxmlformats.org/officeDocument/2006/relationships" xmlns:p="http://schemas.openxmlformats.org/presentationml/2006/main">
   <p:cSld>
     <p:spTree>
@@ -4664,7 +4904,7 @@
           <a:p>
             <a:r>
               <a:rPr lang="en-US" dirty="0"/>
-              <a:t>Tooling (5m): Software and libraries for ML/DL</a:t>
+              <a:t>Tooling (&lt; 5m): Software and libraries for ML/DL</a:t>
             </a:r>
           </a:p>
           <a:p>
@@ -4767,7 +5007,7 @@
           <p:cNvPr id="2" name="Title 1">
             <a:extLst>
               <a:ext uri="{FF2B5EF4-FFF2-40B4-BE49-F238E27FC236}">
-                <a16:creationId xmlns:a16="http://schemas.microsoft.com/office/drawing/2014/main" id="{B19EFB1D-B591-450A-9BEB-4C165C6A95BD}"/>
+                <a16:creationId xmlns:a16="http://schemas.microsoft.com/office/drawing/2014/main" id="{B23575B7-DB72-487B-A8E5-1E51663A5079}"/>
               </a:ext>
             </a:extLst>
           </p:cNvPr>
@@ -4785,7 +5025,7 @@
           <a:p>
             <a:r>
               <a:rPr lang="en-US" dirty="0"/>
-              <a:t>Tooling for Machine/Deep Learning</a:t>
+              <a:t>Disclaimer</a:t>
             </a:r>
           </a:p>
         </p:txBody>
@@ -4795,7 +5035,7 @@
           <p:cNvPr id="3" name="Content Placeholder 2">
             <a:extLst>
               <a:ext uri="{FF2B5EF4-FFF2-40B4-BE49-F238E27FC236}">
-                <a16:creationId xmlns:a16="http://schemas.microsoft.com/office/drawing/2014/main" id="{F16D02D0-44D3-4A39-A8E0-83526D259CE7}"/>
+                <a16:creationId xmlns:a16="http://schemas.microsoft.com/office/drawing/2014/main" id="{40DEC478-4A88-4BAB-9D7B-82C53F7655A0}"/>
               </a:ext>
             </a:extLst>
           </p:cNvPr>
@@ -4808,125 +5048,45 @@
         </p:nvSpPr>
         <p:spPr/>
         <p:txBody>
-          <a:bodyPr>
-            <a:normAutofit fontScale="92500" lnSpcReduction="10000"/>
-          </a:bodyPr>
-          <a:lstStyle/>
-          <a:p>
-            <a:r>
-              <a:rPr lang="en-US" dirty="0"/>
-              <a:t>Primary Deep Learning platforms:</a:t>
+          <a:bodyPr/>
+          <a:lstStyle/>
+          <a:p>
+            <a:r>
+              <a:rPr lang="en-US" dirty="0"/>
+              <a:t>Examples are intended to help convey the workflow of a machine learning approach to a problem. They certainly aren’t intended as optimal solutions to real problems.</a:t>
+            </a:r>
+          </a:p>
+          <a:p>
+            <a:endParaRPr lang="en-US" dirty="0"/>
+          </a:p>
+          <a:p>
+            <a:r>
+              <a:rPr lang="en-US" dirty="0"/>
+              <a:t>All code can be found here:</a:t>
             </a:r>
           </a:p>
           <a:p>
             <a:pPr lvl="1"/>
             <a:r>
-              <a:rPr lang="en-US" dirty="0"/>
-              <a:t>TensorFlow (Google)</a:t>
-            </a:r>
-          </a:p>
-          <a:p>
-            <a:pPr lvl="1"/>
-            <a:r>
-              <a:rPr lang="en-US" dirty="0" err="1"/>
-              <a:t>PyTorch</a:t>
-            </a:r>
-            <a:r>
-              <a:rPr lang="en-US" dirty="0"/>
-              <a:t> / Caffe2 (Facebook with support from Nvidia)</a:t>
-            </a:r>
-          </a:p>
-          <a:p>
-            <a:pPr lvl="1"/>
-            <a:r>
-              <a:rPr lang="en-US" dirty="0" err="1"/>
-              <a:t>MXNet</a:t>
-            </a:r>
-            <a:r>
-              <a:rPr lang="en-US" dirty="0"/>
-              <a:t> (apache project with Amazon support)</a:t>
-            </a:r>
+              <a:rPr lang="en-US" dirty="0">
+                <a:hlinkClick r:id="rId2"/>
+              </a:rPr>
+              <a:t>https://github.com/PJ7668/ml-for-ssa</a:t>
+            </a:r>
+            <a:endParaRPr lang="en-US" dirty="0"/>
           </a:p>
           <a:p>
             <a:pPr marL="457200" lvl="1" indent="0">
               <a:buNone/>
             </a:pPr>
             <a:endParaRPr lang="en-US" dirty="0"/>
-          </a:p>
-          <a:p>
-            <a:r>
-              <a:rPr lang="en-US" dirty="0"/>
-              <a:t>Use whatever environment you already like.</a:t>
-            </a:r>
-          </a:p>
-          <a:p>
-            <a:pPr lvl="1"/>
-            <a:r>
-              <a:rPr lang="en-US" dirty="0"/>
-              <a:t>R (</a:t>
-            </a:r>
-            <a:r>
-              <a:rPr lang="en-US" dirty="0" err="1"/>
-              <a:t>keras</a:t>
-            </a:r>
-            <a:r>
-              <a:rPr lang="en-US" dirty="0"/>
-              <a:t> interface)</a:t>
-            </a:r>
-          </a:p>
-          <a:p>
-            <a:pPr lvl="1"/>
-            <a:r>
-              <a:rPr lang="en-US" dirty="0"/>
-              <a:t>MATLAB (Neural Networking Toolkit)</a:t>
-            </a:r>
-          </a:p>
-          <a:p>
-            <a:pPr lvl="1"/>
-            <a:r>
-              <a:rPr lang="en-US" dirty="0"/>
-              <a:t>Python (</a:t>
-            </a:r>
-            <a:r>
-              <a:rPr lang="en-US" dirty="0" err="1"/>
-              <a:t>keras+tensorflow</a:t>
-            </a:r>
-            <a:r>
-              <a:rPr lang="en-US" dirty="0"/>
-              <a:t> or </a:t>
-            </a:r>
-            <a:r>
-              <a:rPr lang="en-US" dirty="0" err="1"/>
-              <a:t>pytorch</a:t>
-            </a:r>
-            <a:r>
-              <a:rPr lang="en-US" dirty="0"/>
-              <a:t>)</a:t>
-            </a:r>
-          </a:p>
-          <a:p>
-            <a:pPr lvl="1"/>
-            <a:endParaRPr lang="en-US" dirty="0"/>
-          </a:p>
-          <a:p>
-            <a:r>
-              <a:rPr lang="en-US" dirty="0"/>
-              <a:t>Hardware:</a:t>
-            </a:r>
-          </a:p>
-          <a:p>
-            <a:pPr lvl="1"/>
-            <a:r>
-              <a:rPr lang="en-US" dirty="0"/>
-              <a:t>There may come a time you need a GPU, but you don’t need it to get started.</a:t>
-            </a:r>
           </a:p>
         </p:txBody>
       </p:sp>
     </p:spTree>
     <p:extLst>
       <p:ext uri="{BB962C8B-B14F-4D97-AF65-F5344CB8AC3E}">
-        <p14:creationId xmlns:p14="http://schemas.microsoft.com/office/powerpoint/2010/main" val="446307109"/>
+        <p14:creationId xmlns:p14="http://schemas.microsoft.com/office/powerpoint/2010/main" val="1078109396"/>
       </p:ext>
     </p:extLst>
   </p:cSld>
@@ -4958,7 +5118,7 @@
           <p:cNvPr id="2" name="Title 1">
             <a:extLst>
               <a:ext uri="{FF2B5EF4-FFF2-40B4-BE49-F238E27FC236}">
-                <a16:creationId xmlns:a16="http://schemas.microsoft.com/office/drawing/2014/main" id="{005AB2CD-3526-41D2-BDB0-A0BF2E6DDFC6}"/>
+                <a16:creationId xmlns:a16="http://schemas.microsoft.com/office/drawing/2014/main" id="{B19EFB1D-B591-450A-9BEB-4C165C6A95BD}"/>
               </a:ext>
             </a:extLst>
           </p:cNvPr>
@@ -4976,7 +5136,7 @@
           <a:p>
             <a:r>
               <a:rPr lang="en-US" dirty="0"/>
-              <a:t>Dimensionality Reduction Techniques</a:t>
+              <a:t>Tooling for Machine/Deep Learning</a:t>
             </a:r>
           </a:p>
         </p:txBody>
@@ -4986,7 +5146,7 @@
           <p:cNvPr id="3" name="Content Placeholder 2">
             <a:extLst>
               <a:ext uri="{FF2B5EF4-FFF2-40B4-BE49-F238E27FC236}">
-                <a16:creationId xmlns:a16="http://schemas.microsoft.com/office/drawing/2014/main" id="{E022CBBC-3667-4DD7-A4A2-B942E9ACAE7B}"/>
+                <a16:creationId xmlns:a16="http://schemas.microsoft.com/office/drawing/2014/main" id="{F16D02D0-44D3-4A39-A8E0-83526D259CE7}"/>
               </a:ext>
             </a:extLst>
           </p:cNvPr>
@@ -5000,64 +5160,131 @@
         <p:spPr/>
         <p:txBody>
           <a:bodyPr>
-            <a:normAutofit/>
+            <a:normAutofit fontScale="85000" lnSpcReduction="20000"/>
           </a:bodyPr>
           <a:lstStyle/>
           <a:p>
             <a:r>
               <a:rPr lang="en-US" dirty="0"/>
-              <a:t>ML tasks can have many possible input features.</a:t>
-            </a:r>
-          </a:p>
-          <a:p>
-            <a:r>
-              <a:rPr lang="en-US" dirty="0"/>
-              <a:t>Deep Learning Rule of Thumb:</a:t>
+              <a:t>Primary Deep Learning platforms:</a:t>
             </a:r>
           </a:p>
           <a:p>
             <a:pPr lvl="1"/>
             <a:r>
               <a:rPr lang="en-US" dirty="0"/>
-              <a:t>Avoid hand-selecting or engineering features.</a:t>
+              <a:t>TensorFlow (Google)</a:t>
             </a:r>
           </a:p>
           <a:p>
             <a:pPr lvl="1"/>
             <a:r>
-              <a:rPr lang="en-US" dirty="0"/>
-              <a:t>When practical, give neural network access to raw data to identify its own combinations of features.</a:t>
-            </a:r>
-          </a:p>
-          <a:p>
-            <a:r>
-              <a:rPr lang="en-US" dirty="0"/>
-              <a:t>However, using “all the features” is not always practical. Dimensionality reduction techniques can be useful for:</a:t>
+              <a:rPr lang="en-US" dirty="0" err="1"/>
+              <a:t>PyTorch</a:t>
+            </a:r>
+            <a:r>
+              <a:rPr lang="en-US" dirty="0"/>
+              <a:t> / Caffe2 (Facebook with support from Nvidia)</a:t>
             </a:r>
           </a:p>
           <a:p>
             <a:pPr lvl="1"/>
             <a:r>
-              <a:rPr lang="en-US" dirty="0"/>
-              <a:t>Visualization</a:t>
+              <a:rPr lang="en-US" dirty="0" err="1"/>
+              <a:t>MXNet</a:t>
+            </a:r>
+            <a:r>
+              <a:rPr lang="en-US" dirty="0"/>
+              <a:t> (apache project with Amazon support)</a:t>
+            </a:r>
+          </a:p>
+          <a:p>
+            <a:pPr marL="457200" lvl="1" indent="0">
+              <a:buNone/>
+            </a:pPr>
+            <a:endParaRPr lang="en-US" dirty="0"/>
+          </a:p>
+          <a:p>
+            <a:r>
+              <a:rPr lang="en-US" dirty="0"/>
+              <a:t>Use whatever environment you feel productive in:</a:t>
             </a:r>
           </a:p>
           <a:p>
             <a:pPr lvl="1"/>
             <a:r>
               <a:rPr lang="en-US" dirty="0"/>
-              <a:t>Reduce the feature space</a:t>
-            </a:r>
-          </a:p>
-          <a:p>
+              <a:t>R (</a:t>
+            </a:r>
+            <a:r>
+              <a:rPr lang="en-US" dirty="0" err="1"/>
+              <a:t>keras</a:t>
+            </a:r>
+            <a:r>
+              <a:rPr lang="en-US" dirty="0"/>
+              <a:t> interface)</a:t>
+            </a:r>
+          </a:p>
+          <a:p>
+            <a:pPr lvl="1"/>
+            <a:r>
+              <a:rPr lang="en-US" dirty="0"/>
+              <a:t>MATLAB (Neural Networking Toolkit)</a:t>
+            </a:r>
+          </a:p>
+          <a:p>
+            <a:pPr lvl="1"/>
+            <a:r>
+              <a:rPr lang="en-US" dirty="0"/>
+              <a:t>Python (</a:t>
+            </a:r>
+            <a:r>
+              <a:rPr lang="en-US" dirty="0" err="1"/>
+              <a:t>keras+tensorflow</a:t>
+            </a:r>
+            <a:r>
+              <a:rPr lang="en-US" dirty="0"/>
+              <a:t> or </a:t>
+            </a:r>
+            <a:r>
+              <a:rPr lang="en-US" dirty="0" err="1"/>
+              <a:t>pytorch</a:t>
+            </a:r>
+            <a:r>
+              <a:rPr lang="en-US" dirty="0"/>
+              <a:t>)</a:t>
+            </a:r>
+          </a:p>
+          <a:p>
+            <a:pPr lvl="1"/>
             <a:endParaRPr lang="en-US" dirty="0"/>
+          </a:p>
+          <a:p>
+            <a:r>
+              <a:rPr lang="en-US" dirty="0"/>
+              <a:t>Hardware:</a:t>
+            </a:r>
+          </a:p>
+          <a:p>
+            <a:pPr lvl="1"/>
+            <a:r>
+              <a:rPr lang="en-US" dirty="0"/>
+              <a:t>There may come a time you need a GPU, but you don’t need it to get started.</a:t>
+            </a:r>
+          </a:p>
+          <a:p>
+            <a:pPr lvl="1"/>
+            <a:r>
+              <a:rPr lang="en-US" dirty="0"/>
+              <a:t>When you do, you’ll almost certainly be wanting Nvidia hardware running their CUDA libraries, which are well optimized for deep learning on GPUs.</a:t>
+            </a:r>
           </a:p>
         </p:txBody>
       </p:sp>
     </p:spTree>
     <p:extLst>
       <p:ext uri="{BB962C8B-B14F-4D97-AF65-F5344CB8AC3E}">
-        <p14:creationId xmlns:p14="http://schemas.microsoft.com/office/powerpoint/2010/main" val="3483700798"/>
+        <p14:creationId xmlns:p14="http://schemas.microsoft.com/office/powerpoint/2010/main" val="446307109"/>
       </p:ext>
     </p:extLst>
   </p:cSld>
@@ -5089,7 +5316,7 @@
           <p:cNvPr id="2" name="Title 1">
             <a:extLst>
               <a:ext uri="{FF2B5EF4-FFF2-40B4-BE49-F238E27FC236}">
-                <a16:creationId xmlns:a16="http://schemas.microsoft.com/office/drawing/2014/main" id="{2757E5AD-552A-4B05-9F0B-4868732F3066}"/>
+                <a16:creationId xmlns:a16="http://schemas.microsoft.com/office/drawing/2014/main" id="{005AB2CD-3526-41D2-BDB0-A0BF2E6DDFC6}"/>
               </a:ext>
             </a:extLst>
           </p:cNvPr>
@@ -5112,113 +5339,83 @@
           </a:p>
         </p:txBody>
       </p:sp>
-      <p:pic>
-        <p:nvPicPr>
-          <p:cNvPr id="5" name="Content Placeholder 4" descr="A screenshot of a cell phone&#10;&#10;Description generated with high confidence">
-            <a:extLst>
-              <a:ext uri="{FF2B5EF4-FFF2-40B4-BE49-F238E27FC236}">
-                <a16:creationId xmlns:a16="http://schemas.microsoft.com/office/drawing/2014/main" id="{959645A2-47F4-43E9-AD3D-729EA7484027}"/>
-              </a:ext>
-            </a:extLst>
-          </p:cNvPr>
-          <p:cNvPicPr>
-            <a:picLocks noGrp="1" noChangeAspect="1"/>
-          </p:cNvPicPr>
+      <p:sp>
+        <p:nvSpPr>
+          <p:cNvPr id="3" name="Content Placeholder 2">
+            <a:extLst>
+              <a:ext uri="{FF2B5EF4-FFF2-40B4-BE49-F238E27FC236}">
+                <a16:creationId xmlns:a16="http://schemas.microsoft.com/office/drawing/2014/main" id="{E022CBBC-3667-4DD7-A4A2-B942E9ACAE7B}"/>
+              </a:ext>
+            </a:extLst>
+          </p:cNvPr>
+          <p:cNvSpPr>
+            <a:spLocks noGrp="1"/>
+          </p:cNvSpPr>
           <p:nvPr>
             <p:ph idx="1"/>
           </p:nvPr>
-        </p:nvPicPr>
-        <p:blipFill>
-          <a:blip r:embed="rId3">
-            <a:extLst>
-              <a:ext uri="{28A0092B-C50C-407E-A947-70E740481C1C}">
-                <a14:useLocalDpi xmlns:a14="http://schemas.microsoft.com/office/drawing/2010/main" val="0"/>
-              </a:ext>
-            </a:extLst>
-          </a:blip>
-          <a:stretch>
-            <a:fillRect/>
-          </a:stretch>
-        </p:blipFill>
-        <p:spPr>
-          <a:xfrm>
-            <a:off x="838200" y="1690688"/>
-            <a:ext cx="7430151" cy="4636612"/>
-          </a:xfrm>
-        </p:spPr>
-      </p:pic>
-      <p:sp>
-        <p:nvSpPr>
-          <p:cNvPr id="6" name="TextBox 5">
-            <a:extLst>
-              <a:ext uri="{FF2B5EF4-FFF2-40B4-BE49-F238E27FC236}">
-                <a16:creationId xmlns:a16="http://schemas.microsoft.com/office/drawing/2014/main" id="{3CEA6EED-2711-40A3-B430-D502367BCBA3}"/>
-              </a:ext>
-            </a:extLst>
-          </p:cNvPr>
-          <p:cNvSpPr txBox="1"/>
-          <p:nvPr/>
-        </p:nvSpPr>
-        <p:spPr>
-          <a:xfrm>
-            <a:off x="8551572" y="1647720"/>
-            <a:ext cx="3348507" cy="2308324"/>
-          </a:xfrm>
-          <a:prstGeom prst="rect">
-            <a:avLst/>
-          </a:prstGeom>
-          <a:noFill/>
-        </p:spPr>
-        <p:txBody>
-          <a:bodyPr wrap="square" rtlCol="0">
-            <a:spAutoFit/>
+        </p:nvSpPr>
+        <p:spPr/>
+        <p:txBody>
+          <a:bodyPr>
+            <a:normAutofit/>
           </a:bodyPr>
           <a:lstStyle/>
           <a:p>
             <a:r>
               <a:rPr lang="en-US" dirty="0"/>
-              <a:t>Sample TLE data.</a:t>
-            </a:r>
-            <a:br>
-              <a:rPr lang="en-US" dirty="0"/>
-            </a:br>
+              <a:t>ML tasks can have many possible input features.</a:t>
+            </a:r>
+          </a:p>
+          <a:p>
+            <a:r>
+              <a:rPr lang="en-US" dirty="0"/>
+              <a:t>Deep Learning Rule of Thumb:</a:t>
+            </a:r>
+          </a:p>
+          <a:p>
+            <a:pPr lvl="1"/>
+            <a:r>
+              <a:rPr lang="en-US" dirty="0"/>
+              <a:t>Avoid hand-selecting or engineering features.</a:t>
+            </a:r>
+          </a:p>
+          <a:p>
+            <a:pPr lvl="1"/>
+            <a:r>
+              <a:rPr lang="en-US" dirty="0"/>
+              <a:t>When practical, give neural network access to raw data to identify its own combinations of features.</a:t>
+            </a:r>
+          </a:p>
+          <a:p>
+            <a:r>
+              <a:rPr lang="en-US" dirty="0"/>
+              <a:t>However, using “all the features” is not always practical. Dimensionality reduction techniques can be useful for:</a:t>
+            </a:r>
+          </a:p>
+          <a:p>
+            <a:pPr lvl="1"/>
+            <a:r>
+              <a:rPr lang="en-US" dirty="0"/>
+              <a:t>Visualization</a:t>
+            </a:r>
+          </a:p>
+          <a:p>
+            <a:pPr lvl="1"/>
+            <a:r>
+              <a:rPr lang="en-US" dirty="0"/>
+              <a:t>Reduce the feature space</a:t>
+            </a:r>
+          </a:p>
+          <a:p>
             <a:endParaRPr lang="en-US" dirty="0"/>
-          </a:p>
-          <a:p>
-            <a:r>
-              <a:rPr lang="en-US" dirty="0"/>
-              <a:t>9 real valued fields</a:t>
-            </a:r>
-          </a:p>
-          <a:p>
-            <a:r>
-              <a:rPr lang="en-US" dirty="0"/>
-              <a:t>1 categorical field (group)</a:t>
-            </a:r>
-          </a:p>
-          <a:p>
-            <a:endParaRPr lang="en-US" dirty="0"/>
-          </a:p>
-          <a:p>
-            <a:r>
-              <a:rPr lang="en-US" dirty="0"/>
-              <a:t>“group” comes from the way </a:t>
-            </a:r>
-            <a:r>
-              <a:rPr lang="en-US" dirty="0" err="1"/>
-              <a:t>CelesTrak</a:t>
-            </a:r>
-            <a:r>
-              <a:rPr lang="en-US" dirty="0"/>
-              <a:t> categorized the given TLE.</a:t>
-            </a:r>
           </a:p>
         </p:txBody>
       </p:sp>
     </p:spTree>
     <p:extLst>
       <p:ext uri="{BB962C8B-B14F-4D97-AF65-F5344CB8AC3E}">
-        <p14:creationId xmlns:p14="http://schemas.microsoft.com/office/powerpoint/2010/main" val="2599186233"/>
+        <p14:creationId xmlns:p14="http://schemas.microsoft.com/office/powerpoint/2010/main" val="3483700798"/>
       </p:ext>
     </p:extLst>
   </p:cSld>
@@ -5245,19 +5442,49 @@
           <a:chExt cx="0" cy="0"/>
         </a:xfrm>
       </p:grpSpPr>
+      <p:sp>
+        <p:nvSpPr>
+          <p:cNvPr id="2" name="Title 1">
+            <a:extLst>
+              <a:ext uri="{FF2B5EF4-FFF2-40B4-BE49-F238E27FC236}">
+                <a16:creationId xmlns:a16="http://schemas.microsoft.com/office/drawing/2014/main" id="{2757E5AD-552A-4B05-9F0B-4868732F3066}"/>
+              </a:ext>
+            </a:extLst>
+          </p:cNvPr>
+          <p:cNvSpPr>
+            <a:spLocks noGrp="1"/>
+          </p:cNvSpPr>
+          <p:nvPr>
+            <p:ph type="title"/>
+          </p:nvPr>
+        </p:nvSpPr>
+        <p:spPr/>
+        <p:txBody>
+          <a:bodyPr/>
+          <a:lstStyle/>
+          <a:p>
+            <a:r>
+              <a:rPr lang="en-US" dirty="0"/>
+              <a:t>Dimensionality Reduction</a:t>
+            </a:r>
+          </a:p>
+        </p:txBody>
+      </p:sp>
       <p:pic>
         <p:nvPicPr>
-          <p:cNvPr id="16" name="Picture 15" descr="A close up of a map&#10;&#10;Description generated with high confidence">
-            <a:extLst>
-              <a:ext uri="{FF2B5EF4-FFF2-40B4-BE49-F238E27FC236}">
-                <a16:creationId xmlns:a16="http://schemas.microsoft.com/office/drawing/2014/main" id="{6E17C891-F704-4492-AF81-D89485BED9DD}"/>
+          <p:cNvPr id="5" name="Content Placeholder 4" descr="A screenshot of a cell phone&#10;&#10;Description generated with high confidence">
+            <a:extLst>
+              <a:ext uri="{FF2B5EF4-FFF2-40B4-BE49-F238E27FC236}">
+                <a16:creationId xmlns:a16="http://schemas.microsoft.com/office/drawing/2014/main" id="{959645A2-47F4-43E9-AD3D-729EA7484027}"/>
               </a:ext>
             </a:extLst>
           </p:cNvPr>
           <p:cNvPicPr>
-            <a:picLocks noChangeAspect="1"/>
+            <a:picLocks noGrp="1" noChangeAspect="1"/>
           </p:cNvPicPr>
-          <p:nvPr/>
+          <p:nvPr>
+            <p:ph idx="1"/>
+          </p:nvPr>
         </p:nvPicPr>
         <p:blipFill>
           <a:blip r:embed="rId3">
@@ -5273,55 +5500,17 @@
         </p:blipFill>
         <p:spPr>
           <a:xfrm>
-            <a:off x="5310757" y="4150125"/>
-            <a:ext cx="6123536" cy="2139008"/>
-          </a:xfrm>
-          <a:prstGeom prst="rect">
-            <a:avLst/>
-          </a:prstGeom>
-        </p:spPr>
-      </p:pic>
-      <p:pic>
-        <p:nvPicPr>
-          <p:cNvPr id="13" name="Content Placeholder 12" descr="A close up of a map&#10;&#10;Description generated with very high confidence">
-            <a:extLst>
-              <a:ext uri="{FF2B5EF4-FFF2-40B4-BE49-F238E27FC236}">
-                <a16:creationId xmlns:a16="http://schemas.microsoft.com/office/drawing/2014/main" id="{F3BF2446-A31C-4757-9E34-111CFD81EF1E}"/>
-              </a:ext>
-            </a:extLst>
-          </p:cNvPr>
-          <p:cNvPicPr>
-            <a:picLocks noGrp="1" noChangeAspect="1"/>
-          </p:cNvPicPr>
-          <p:nvPr>
-            <p:ph idx="1"/>
-          </p:nvPr>
-        </p:nvPicPr>
-        <p:blipFill>
-          <a:blip r:embed="rId4">
-            <a:extLst>
-              <a:ext uri="{28A0092B-C50C-407E-A947-70E740481C1C}">
-                <a14:useLocalDpi xmlns:a14="http://schemas.microsoft.com/office/drawing/2010/main" val="0"/>
-              </a:ext>
-            </a:extLst>
-          </a:blip>
-          <a:stretch>
-            <a:fillRect/>
-          </a:stretch>
-        </p:blipFill>
-        <p:spPr>
-          <a:xfrm>
-            <a:off x="727656" y="206397"/>
-            <a:ext cx="10736688" cy="3738670"/>
+            <a:off x="838200" y="1690688"/>
+            <a:ext cx="7430151" cy="4636612"/>
           </a:xfrm>
         </p:spPr>
       </p:pic>
       <p:sp>
         <p:nvSpPr>
-          <p:cNvPr id="14" name="TextBox 13">
-            <a:extLst>
-              <a:ext uri="{FF2B5EF4-FFF2-40B4-BE49-F238E27FC236}">
-                <a16:creationId xmlns:a16="http://schemas.microsoft.com/office/drawing/2014/main" id="{D09D8EB7-72D3-4B0D-8B5C-B37C9389FDC0}"/>
+          <p:cNvPr id="6" name="TextBox 5">
+            <a:extLst>
+              <a:ext uri="{FF2B5EF4-FFF2-40B4-BE49-F238E27FC236}">
+                <a16:creationId xmlns:a16="http://schemas.microsoft.com/office/drawing/2014/main" id="{3CEA6EED-2711-40A3-B430-D502367BCBA3}"/>
               </a:ext>
             </a:extLst>
           </p:cNvPr>
@@ -5330,8 +5519,8 @@
         </p:nvSpPr>
         <p:spPr>
           <a:xfrm>
-            <a:off x="757707" y="4150125"/>
-            <a:ext cx="4479334" cy="2308324"/>
+            <a:off x="8551572" y="1647720"/>
+            <a:ext cx="3348507" cy="2308324"/>
           </a:xfrm>
           <a:prstGeom prst="rect">
             <a:avLst/>
@@ -5344,46 +5533,42 @@
           </a:bodyPr>
           <a:lstStyle/>
           <a:p>
-            <a:pPr marL="285750" indent="-285750">
-              <a:buFont typeface="Arial" panose="020B0604020202020204" pitchFamily="34" charset="0"/>
-              <a:buChar char="•"/>
-            </a:pPr>
-            <a:r>
-              <a:rPr lang="en-US" dirty="0"/>
-              <a:t>2D embeddings of the 9D feature vectors</a:t>
-            </a:r>
-          </a:p>
-          <a:p>
-            <a:pPr marL="285750" indent="-285750">
-              <a:buFont typeface="Arial" panose="020B0604020202020204" pitchFamily="34" charset="0"/>
-              <a:buChar char="•"/>
-            </a:pPr>
-            <a:r>
-              <a:rPr lang="en-US" dirty="0"/>
-              <a:t>Group field mapped to color</a:t>
-            </a:r>
-          </a:p>
-          <a:p>
-            <a:pPr marL="285750" indent="-285750">
-              <a:buFont typeface="Arial" panose="020B0604020202020204" pitchFamily="34" charset="0"/>
-              <a:buChar char="•"/>
-            </a:pPr>
-            <a:r>
-              <a:rPr lang="en-US" dirty="0"/>
-              <a:t>(right) Just “planet” and “resource” groups</a:t>
-            </a:r>
-          </a:p>
-          <a:p>
-            <a:pPr marL="285750" indent="-285750">
-              <a:buFont typeface="Arial" panose="020B0604020202020204" pitchFamily="34" charset="0"/>
-              <a:buChar char="•"/>
-            </a:pPr>
+            <a:r>
+              <a:rPr lang="en-US" dirty="0"/>
+              <a:t>Sample TLE data.</a:t>
+            </a:r>
+            <a:br>
+              <a:rPr lang="en-US" dirty="0"/>
+            </a:br>
             <a:endParaRPr lang="en-US" dirty="0"/>
           </a:p>
           <a:p>
             <a:r>
               <a:rPr lang="en-US" dirty="0"/>
-              <a:t>The visualizations suggest we should be able to make some better-than-random guesses about the group field based just on the numeric fields.</a:t>
+              <a:t>9 real valued fields</a:t>
+            </a:r>
+          </a:p>
+          <a:p>
+            <a:r>
+              <a:rPr lang="en-US" dirty="0"/>
+              <a:t>1 categorical field (group)</a:t>
+            </a:r>
+          </a:p>
+          <a:p>
+            <a:endParaRPr lang="en-US" dirty="0"/>
+          </a:p>
+          <a:p>
+            <a:r>
+              <a:rPr lang="en-US" dirty="0"/>
+              <a:t>“group” comes from the way </a:t>
+            </a:r>
+            <a:r>
+              <a:rPr lang="en-US" dirty="0" err="1"/>
+              <a:t>CelesTrak</a:t>
+            </a:r>
+            <a:r>
+              <a:rPr lang="en-US" dirty="0"/>
+              <a:t> categorized the given TLE.</a:t>
             </a:r>
           </a:p>
         </p:txBody>
@@ -5391,7 +5576,7 @@
     </p:spTree>
     <p:extLst>
       <p:ext uri="{BB962C8B-B14F-4D97-AF65-F5344CB8AC3E}">
-        <p14:creationId xmlns:p14="http://schemas.microsoft.com/office/powerpoint/2010/main" val="1320120808"/>
+        <p14:creationId xmlns:p14="http://schemas.microsoft.com/office/powerpoint/2010/main" val="2599186233"/>
       </p:ext>
     </p:extLst>
   </p:cSld>
@@ -5418,139 +5603,145 @@
           <a:chExt cx="0" cy="0"/>
         </a:xfrm>
       </p:grpSpPr>
-      <p:sp>
-        <p:nvSpPr>
-          <p:cNvPr id="2" name="Title 1">
-            <a:extLst>
-              <a:ext uri="{FF2B5EF4-FFF2-40B4-BE49-F238E27FC236}">
-                <a16:creationId xmlns:a16="http://schemas.microsoft.com/office/drawing/2014/main" id="{E3AC361C-257F-4D6C-A685-21C8DCDCA1E0}"/>
-              </a:ext>
-            </a:extLst>
-          </p:cNvPr>
-          <p:cNvSpPr>
-            <a:spLocks noGrp="1"/>
-          </p:cNvSpPr>
-          <p:nvPr>
-            <p:ph type="title"/>
-          </p:nvPr>
-        </p:nvSpPr>
-        <p:spPr/>
-        <p:txBody>
-          <a:bodyPr/>
-          <a:lstStyle/>
-          <a:p>
-            <a:r>
-              <a:rPr lang="en-US" dirty="0"/>
-              <a:t>Classification</a:t>
-            </a:r>
-          </a:p>
-        </p:txBody>
-      </p:sp>
-      <p:sp>
-        <p:nvSpPr>
-          <p:cNvPr id="3" name="Content Placeholder 2">
-            <a:extLst>
-              <a:ext uri="{FF2B5EF4-FFF2-40B4-BE49-F238E27FC236}">
-                <a16:creationId xmlns:a16="http://schemas.microsoft.com/office/drawing/2014/main" id="{855D344C-4EB5-4C8B-980C-77375A99B607}"/>
-              </a:ext>
-            </a:extLst>
-          </p:cNvPr>
-          <p:cNvSpPr>
-            <a:spLocks noGrp="1"/>
-          </p:cNvSpPr>
+      <p:pic>
+        <p:nvPicPr>
+          <p:cNvPr id="16" name="Picture 15" descr="A close up of a map&#10;&#10;Description generated with high confidence">
+            <a:extLst>
+              <a:ext uri="{FF2B5EF4-FFF2-40B4-BE49-F238E27FC236}">
+                <a16:creationId xmlns:a16="http://schemas.microsoft.com/office/drawing/2014/main" id="{6E17C891-F704-4492-AF81-D89485BED9DD}"/>
+              </a:ext>
+            </a:extLst>
+          </p:cNvPr>
+          <p:cNvPicPr>
+            <a:picLocks noChangeAspect="1"/>
+          </p:cNvPicPr>
+          <p:nvPr/>
+        </p:nvPicPr>
+        <p:blipFill>
+          <a:blip r:embed="rId3">
+            <a:extLst>
+              <a:ext uri="{28A0092B-C50C-407E-A947-70E740481C1C}">
+                <a14:useLocalDpi xmlns:a14="http://schemas.microsoft.com/office/drawing/2010/main" val="0"/>
+              </a:ext>
+            </a:extLst>
+          </a:blip>
+          <a:stretch>
+            <a:fillRect/>
+          </a:stretch>
+        </p:blipFill>
+        <p:spPr>
+          <a:xfrm>
+            <a:off x="5310757" y="4150125"/>
+            <a:ext cx="6123536" cy="2139008"/>
+          </a:xfrm>
+          <a:prstGeom prst="rect">
+            <a:avLst/>
+          </a:prstGeom>
+        </p:spPr>
+      </p:pic>
+      <p:pic>
+        <p:nvPicPr>
+          <p:cNvPr id="13" name="Content Placeholder 12" descr="A close up of a map&#10;&#10;Description generated with very high confidence">
+            <a:extLst>
+              <a:ext uri="{FF2B5EF4-FFF2-40B4-BE49-F238E27FC236}">
+                <a16:creationId xmlns:a16="http://schemas.microsoft.com/office/drawing/2014/main" id="{F3BF2446-A31C-4757-9E34-111CFD81EF1E}"/>
+              </a:ext>
+            </a:extLst>
+          </p:cNvPr>
+          <p:cNvPicPr>
+            <a:picLocks noGrp="1" noChangeAspect="1"/>
+          </p:cNvPicPr>
           <p:nvPr>
             <p:ph idx="1"/>
           </p:nvPr>
-        </p:nvSpPr>
-        <p:spPr/>
-        <p:txBody>
-          <a:bodyPr>
-            <a:normAutofit/>
+        </p:nvPicPr>
+        <p:blipFill>
+          <a:blip r:embed="rId4">
+            <a:extLst>
+              <a:ext uri="{28A0092B-C50C-407E-A947-70E740481C1C}">
+                <a14:useLocalDpi xmlns:a14="http://schemas.microsoft.com/office/drawing/2010/main" val="0"/>
+              </a:ext>
+            </a:extLst>
+          </a:blip>
+          <a:stretch>
+            <a:fillRect/>
+          </a:stretch>
+        </p:blipFill>
+        <p:spPr>
+          <a:xfrm>
+            <a:off x="727656" y="206397"/>
+            <a:ext cx="10736688" cy="3738670"/>
+          </a:xfrm>
+        </p:spPr>
+      </p:pic>
+      <p:sp>
+        <p:nvSpPr>
+          <p:cNvPr id="14" name="TextBox 13">
+            <a:extLst>
+              <a:ext uri="{FF2B5EF4-FFF2-40B4-BE49-F238E27FC236}">
+                <a16:creationId xmlns:a16="http://schemas.microsoft.com/office/drawing/2014/main" id="{D09D8EB7-72D3-4B0D-8B5C-B37C9389FDC0}"/>
+              </a:ext>
+            </a:extLst>
+          </p:cNvPr>
+          <p:cNvSpPr txBox="1"/>
+          <p:nvPr/>
+        </p:nvSpPr>
+        <p:spPr>
+          <a:xfrm>
+            <a:off x="757707" y="4150125"/>
+            <a:ext cx="4479334" cy="2308324"/>
+          </a:xfrm>
+          <a:prstGeom prst="rect">
+            <a:avLst/>
+          </a:prstGeom>
+          <a:noFill/>
+        </p:spPr>
+        <p:txBody>
+          <a:bodyPr wrap="square" rtlCol="0">
+            <a:spAutoFit/>
           </a:bodyPr>
           <a:lstStyle/>
           <a:p>
-            <a:pPr marL="0" indent="0">
-              <a:buNone/>
+            <a:pPr marL="285750" indent="-285750">
+              <a:buFont typeface="Arial" panose="020B0604020202020204" pitchFamily="34" charset="0"/>
+              <a:buChar char="•"/>
             </a:pPr>
             <a:r>
               <a:rPr lang="en-US" dirty="0"/>
-              <a:t>Goal: Predict group field based on 9 TLE derived, numeric fields.</a:t>
-            </a:r>
-          </a:p>
-          <a:p>
-            <a:pPr marL="0" indent="0">
-              <a:buNone/>
+              <a:t>2D embeddings of the 9D feature vectors</a:t>
+            </a:r>
+          </a:p>
+          <a:p>
+            <a:pPr marL="285750" indent="-285750">
+              <a:buFont typeface="Arial" panose="020B0604020202020204" pitchFamily="34" charset="0"/>
+              <a:buChar char="•"/>
+            </a:pPr>
+            <a:r>
+              <a:rPr lang="en-US" dirty="0"/>
+              <a:t>Group field mapped to color</a:t>
+            </a:r>
+          </a:p>
+          <a:p>
+            <a:pPr marL="285750" indent="-285750">
+              <a:buFont typeface="Arial" panose="020B0604020202020204" pitchFamily="34" charset="0"/>
+              <a:buChar char="•"/>
+            </a:pPr>
+            <a:r>
+              <a:rPr lang="en-US" dirty="0"/>
+              <a:t>(right) Just “planet” and “resource” groups</a:t>
+            </a:r>
+          </a:p>
+          <a:p>
+            <a:pPr marL="285750" indent="-285750">
+              <a:buFont typeface="Arial" panose="020B0604020202020204" pitchFamily="34" charset="0"/>
+              <a:buChar char="•"/>
             </a:pPr>
             <a:endParaRPr lang="en-US" dirty="0"/>
           </a:p>
           <a:p>
-            <a:pPr marL="514350" indent="-514350">
-              <a:buFont typeface="+mj-lt"/>
-              <a:buAutoNum type="arabicPeriod"/>
-            </a:pPr>
-            <a:r>
-              <a:rPr lang="en-US" dirty="0"/>
-              <a:t>Split data into train, test, and validation sets</a:t>
-            </a:r>
-          </a:p>
-          <a:p>
-            <a:pPr marL="514350" indent="-514350">
-              <a:buFont typeface="+mj-lt"/>
-              <a:buAutoNum type="arabicPeriod"/>
-            </a:pPr>
-            <a:r>
-              <a:rPr lang="en-US" dirty="0"/>
-              <a:t>Choose a metric (preferably a single, real-valued number)</a:t>
-            </a:r>
-          </a:p>
-          <a:p>
-            <a:pPr marL="514350" indent="-514350">
-              <a:buFont typeface="+mj-lt"/>
-              <a:buAutoNum type="arabicPeriod"/>
-            </a:pPr>
-            <a:r>
-              <a:rPr lang="en-US" dirty="0"/>
-              <a:t>Choose a model</a:t>
-            </a:r>
-          </a:p>
-          <a:p>
-            <a:pPr marL="971550" lvl="1" indent="-514350">
-              <a:buFont typeface="+mj-lt"/>
-              <a:buAutoNum type="arabicPeriod"/>
-            </a:pPr>
-            <a:r>
-              <a:rPr lang="en-US" dirty="0"/>
-              <a:t>Train model on train set</a:t>
-            </a:r>
-          </a:p>
-          <a:p>
-            <a:pPr marL="971550" lvl="1" indent="-514350">
-              <a:buFont typeface="+mj-lt"/>
-              <a:buAutoNum type="arabicPeriod"/>
-            </a:pPr>
-            <a:r>
-              <a:rPr lang="en-US" dirty="0"/>
-              <a:t>Compute metric on test set</a:t>
-            </a:r>
-          </a:p>
-          <a:p>
-            <a:pPr marL="971550" lvl="1" indent="-514350">
-              <a:buFont typeface="+mj-lt"/>
-              <a:buAutoNum type="arabicPeriod"/>
-            </a:pPr>
-            <a:r>
-              <a:rPr lang="en-US" dirty="0"/>
-              <a:t>Adjust model and repeat</a:t>
-            </a:r>
-          </a:p>
-          <a:p>
-            <a:pPr marL="514350" indent="-514350">
-              <a:buFont typeface="+mj-lt"/>
-              <a:buAutoNum type="arabicPeriod"/>
-            </a:pPr>
-            <a:r>
-              <a:rPr lang="en-US" dirty="0"/>
-              <a:t>Evaluate model on validation set</a:t>
+            <a:r>
+              <a:rPr lang="en-US" dirty="0"/>
+              <a:t>The visualizations suggest we should be able to make some better-than-random guesses about the group field based just on the numeric fields.</a:t>
             </a:r>
           </a:p>
         </p:txBody>
@@ -5558,7 +5749,7 @@
     </p:spTree>
     <p:extLst>
       <p:ext uri="{BB962C8B-B14F-4D97-AF65-F5344CB8AC3E}">
-        <p14:creationId xmlns:p14="http://schemas.microsoft.com/office/powerpoint/2010/main" val="2194074296"/>
+        <p14:creationId xmlns:p14="http://schemas.microsoft.com/office/powerpoint/2010/main" val="1320120808"/>
       </p:ext>
     </p:extLst>
   </p:cSld>
@@ -5590,7 +5781,7 @@
           <p:cNvPr id="2" name="Title 1">
             <a:extLst>
               <a:ext uri="{FF2B5EF4-FFF2-40B4-BE49-F238E27FC236}">
-                <a16:creationId xmlns:a16="http://schemas.microsoft.com/office/drawing/2014/main" id="{ECC9B202-80CE-4948-A80E-959B61F2A911}"/>
+                <a16:creationId xmlns:a16="http://schemas.microsoft.com/office/drawing/2014/main" id="{E3AC361C-257F-4D6C-A685-21C8DCDCA1E0}"/>
               </a:ext>
             </a:extLst>
           </p:cNvPr>
@@ -5618,7 +5809,7 @@
           <p:cNvPr id="3" name="Content Placeholder 2">
             <a:extLst>
               <a:ext uri="{FF2B5EF4-FFF2-40B4-BE49-F238E27FC236}">
-                <a16:creationId xmlns:a16="http://schemas.microsoft.com/office/drawing/2014/main" id="{73C5B286-A9F0-4B3E-8095-CAE1E58B7090}"/>
+                <a16:creationId xmlns:a16="http://schemas.microsoft.com/office/drawing/2014/main" id="{855D344C-4EB5-4C8B-980C-77375A99B607}"/>
               </a:ext>
             </a:extLst>
           </p:cNvPr>
@@ -5631,7 +5822,9 @@
         </p:nvSpPr>
         <p:spPr/>
         <p:txBody>
-          <a:bodyPr/>
+          <a:bodyPr>
+            <a:normAutofit lnSpcReduction="10000"/>
+          </a:bodyPr>
           <a:lstStyle/>
           <a:p>
             <a:pPr marL="0" indent="0">
@@ -5639,7 +5832,92 @@
             </a:pPr>
             <a:r>
               <a:rPr lang="en-US" dirty="0"/>
-              <a:t>[ See Notebook for this Section ]</a:t>
+              <a:t>Goal: Predict group field based on 9 TLE derived, numeric fields.</a:t>
+            </a:r>
+          </a:p>
+          <a:p>
+            <a:pPr marL="0" indent="0">
+              <a:buNone/>
+            </a:pPr>
+            <a:endParaRPr lang="en-US" dirty="0"/>
+          </a:p>
+          <a:p>
+            <a:pPr marL="0" indent="0">
+              <a:buNone/>
+            </a:pPr>
+            <a:r>
+              <a:rPr lang="en-US" b="1" dirty="0"/>
+              <a:t>Machine Learning Work Flow</a:t>
+            </a:r>
+          </a:p>
+          <a:p>
+            <a:pPr marL="514350" indent="-514350">
+              <a:buFont typeface="+mj-lt"/>
+              <a:buAutoNum type="arabicPeriod"/>
+            </a:pPr>
+            <a:r>
+              <a:rPr lang="en-US" dirty="0"/>
+              <a:t>Split data into train, test, and validation sets</a:t>
+            </a:r>
+          </a:p>
+          <a:p>
+            <a:pPr marL="514350" indent="-514350">
+              <a:buFont typeface="+mj-lt"/>
+              <a:buAutoNum type="arabicPeriod"/>
+            </a:pPr>
+            <a:r>
+              <a:rPr lang="en-US" dirty="0"/>
+              <a:t>Choose a metric (preferably a single, real-valued number)</a:t>
+            </a:r>
+          </a:p>
+          <a:p>
+            <a:pPr marL="514350" indent="-514350">
+              <a:buFont typeface="+mj-lt"/>
+              <a:buAutoNum type="arabicPeriod"/>
+            </a:pPr>
+            <a:r>
+              <a:rPr lang="en-US" dirty="0"/>
+              <a:t>Choose a model</a:t>
+            </a:r>
+          </a:p>
+          <a:p>
+            <a:pPr marL="971550" lvl="1" indent="-514350">
+              <a:buFont typeface="+mj-lt"/>
+              <a:buAutoNum type="arabicPeriod"/>
+            </a:pPr>
+            <a:r>
+              <a:rPr lang="en-US" dirty="0"/>
+              <a:t>Train model on train set</a:t>
+            </a:r>
+          </a:p>
+          <a:p>
+            <a:pPr marL="971550" lvl="1" indent="-514350">
+              <a:buFont typeface="+mj-lt"/>
+              <a:buAutoNum type="arabicPeriod"/>
+            </a:pPr>
+            <a:r>
+              <a:rPr lang="en-US" dirty="0"/>
+              <a:t>Compute metric on test set</a:t>
+            </a:r>
+          </a:p>
+          <a:p>
+            <a:pPr marL="971550" lvl="1" indent="-514350">
+              <a:buFont typeface="+mj-lt"/>
+              <a:buAutoNum type="arabicPeriod"/>
+            </a:pPr>
+            <a:r>
+              <a:rPr lang="en-US" dirty="0"/>
+              <a:t>Adjust model and repeat</a:t>
+            </a:r>
+          </a:p>
+          <a:p>
+            <a:pPr marL="514350" indent="-514350">
+              <a:buFont typeface="+mj-lt"/>
+              <a:buAutoNum type="arabicPeriod"/>
+            </a:pPr>
+            <a:r>
+              <a:rPr lang="en-US" dirty="0"/>
+              <a:t>Evaluate model on validation set</a:t>
             </a:r>
           </a:p>
         </p:txBody>
@@ -5647,7 +5925,7 @@
     </p:spTree>
     <p:extLst>
       <p:ext uri="{BB962C8B-B14F-4D97-AF65-F5344CB8AC3E}">
-        <p14:creationId xmlns:p14="http://schemas.microsoft.com/office/powerpoint/2010/main" val="1812924170"/>
+        <p14:creationId xmlns:p14="http://schemas.microsoft.com/office/powerpoint/2010/main" val="2194074296"/>
       </p:ext>
     </p:extLst>
   </p:cSld>
@@ -5679,7 +5957,7 @@
           <p:cNvPr id="2" name="Title 1">
             <a:extLst>
               <a:ext uri="{FF2B5EF4-FFF2-40B4-BE49-F238E27FC236}">
-                <a16:creationId xmlns:a16="http://schemas.microsoft.com/office/drawing/2014/main" id="{0E22603D-14F1-4117-A473-59E0C22862C3}"/>
+                <a16:creationId xmlns:a16="http://schemas.microsoft.com/office/drawing/2014/main" id="{77073B25-638E-41C3-BF08-9BECE5E6D159}"/>
               </a:ext>
             </a:extLst>
           </p:cNvPr>
@@ -5697,40 +5975,127 @@
           <a:p>
             <a:r>
               <a:rPr lang="en-US" dirty="0"/>
-              <a:t>Convolutional Neural Networks</a:t>
-            </a:r>
-          </a:p>
-        </p:txBody>
-      </p:sp>
-      <p:sp>
-        <p:nvSpPr>
-          <p:cNvPr id="5" name="Text Placeholder 4">
-            <a:extLst>
-              <a:ext uri="{FF2B5EF4-FFF2-40B4-BE49-F238E27FC236}">
-                <a16:creationId xmlns:a16="http://schemas.microsoft.com/office/drawing/2014/main" id="{ABC9E725-B1B7-45D9-9C9A-5C7785D16D7B}"/>
-              </a:ext>
-            </a:extLst>
-          </p:cNvPr>
-          <p:cNvSpPr>
-            <a:spLocks noGrp="1"/>
-          </p:cNvSpPr>
-          <p:nvPr>
-            <p:ph type="body" idx="1"/>
-          </p:nvPr>
-        </p:nvSpPr>
-        <p:spPr/>
-        <p:txBody>
-          <a:bodyPr/>
-          <a:lstStyle/>
-          <a:p>
-            <a:endParaRPr lang="en-US"/>
+              <a:t>Vocabulary</a:t>
+            </a:r>
+          </a:p>
+        </p:txBody>
+      </p:sp>
+      <p:sp>
+        <p:nvSpPr>
+          <p:cNvPr id="3" name="Content Placeholder 2">
+            <a:extLst>
+              <a:ext uri="{FF2B5EF4-FFF2-40B4-BE49-F238E27FC236}">
+                <a16:creationId xmlns:a16="http://schemas.microsoft.com/office/drawing/2014/main" id="{A6A8D6DC-1844-4471-9B01-90755151DB0C}"/>
+              </a:ext>
+            </a:extLst>
+          </p:cNvPr>
+          <p:cNvSpPr>
+            <a:spLocks noGrp="1"/>
+          </p:cNvSpPr>
+          <p:nvPr>
+            <p:ph idx="1"/>
+          </p:nvPr>
+        </p:nvSpPr>
+        <p:spPr/>
+        <p:txBody>
+          <a:bodyPr>
+            <a:normAutofit fontScale="92500" lnSpcReduction="10000"/>
+          </a:bodyPr>
+          <a:lstStyle/>
+          <a:p>
+            <a:r>
+              <a:rPr lang="en-US" dirty="0"/>
+              <a:t>Train/Test/Validation Sets:</a:t>
+            </a:r>
+          </a:p>
+          <a:p>
+            <a:pPr lvl="1"/>
+            <a:r>
+              <a:rPr lang="en-US" dirty="0"/>
+              <a:t>Train: Data used to update model parameters.</a:t>
+            </a:r>
+          </a:p>
+          <a:p>
+            <a:pPr lvl="1"/>
+            <a:r>
+              <a:rPr lang="en-US" dirty="0"/>
+              <a:t>Test: Data used to update model hyper-</a:t>
+            </a:r>
+            <a:r>
+              <a:rPr lang="en-US" dirty="0" err="1"/>
+              <a:t>parmeters</a:t>
+            </a:r>
+            <a:r>
+              <a:rPr lang="en-US" dirty="0"/>
+              <a:t>.</a:t>
+            </a:r>
+          </a:p>
+          <a:p>
+            <a:pPr lvl="1"/>
+            <a:r>
+              <a:rPr lang="en-US" dirty="0"/>
+              <a:t>Validation: Data used to measure performance of selected model.</a:t>
+            </a:r>
+          </a:p>
+          <a:p>
+            <a:r>
+              <a:rPr lang="en-US" dirty="0"/>
+              <a:t>Training Vocabulary:</a:t>
+            </a:r>
+          </a:p>
+          <a:p>
+            <a:pPr lvl="1"/>
+            <a:r>
+              <a:rPr lang="en-US" dirty="0"/>
+              <a:t>Epoch – one full pass through test train set</a:t>
+            </a:r>
+          </a:p>
+          <a:p>
+            <a:pPr lvl="1"/>
+            <a:r>
+              <a:rPr lang="en-US" dirty="0"/>
+              <a:t>Batch Size – how many examples to evaluate at once. Typically, a </a:t>
+            </a:r>
+            <a:r>
+              <a:rPr lang="en-US" dirty="0" err="1"/>
+              <a:t>gradiant</a:t>
+            </a:r>
+            <a:r>
+              <a:rPr lang="en-US" dirty="0"/>
+              <a:t> is computed on this data.</a:t>
+            </a:r>
+          </a:p>
+          <a:p>
+            <a:pPr lvl="1"/>
+            <a:r>
+              <a:rPr lang="en-US" dirty="0"/>
+              <a:t>Loss – </a:t>
+            </a:r>
+            <a:r>
+              <a:rPr lang="en-US" i="1" dirty="0"/>
+              <a:t>differentiable</a:t>
+            </a:r>
+            <a:r>
+              <a:rPr lang="en-US" dirty="0"/>
+              <a:t> function comparing predictions and targets: model(x) vs y.</a:t>
+            </a:r>
+          </a:p>
+          <a:p>
+            <a:pPr lvl="1"/>
+            <a:r>
+              <a:rPr lang="en-US" dirty="0"/>
+              <a:t>Stochastic Gradient Descent (SGD) – the algorithm for efficiently updating model parameters by computing partial derivatives of loss(model(x), y) over a batch of samples.</a:t>
+            </a:r>
+          </a:p>
+          <a:p>
+            <a:endParaRPr lang="en-US" dirty="0"/>
           </a:p>
         </p:txBody>
       </p:sp>
     </p:spTree>
     <p:extLst>
       <p:ext uri="{BB962C8B-B14F-4D97-AF65-F5344CB8AC3E}">
-        <p14:creationId xmlns:p14="http://schemas.microsoft.com/office/powerpoint/2010/main" val="4180393728"/>
+        <p14:creationId xmlns:p14="http://schemas.microsoft.com/office/powerpoint/2010/main" val="3459832265"/>
       </p:ext>
     </p:extLst>
   </p:cSld>

</xml_diff>

<commit_message>
Updates to TLE and Asteroid Notebook 1
</commit_message>
<xml_diff>
--- a/ML4SSA.pptx
+++ b/ML4SSA.pptx
@@ -5,7 +5,7 @@
     <p:sldMasterId id="2147483648" r:id="rId1"/>
   </p:sldMasterIdLst>
   <p:notesMasterIdLst>
-    <p:notesMasterId r:id="rId16"/>
+    <p:notesMasterId r:id="rId22"/>
   </p:notesMasterIdLst>
   <p:sldIdLst>
     <p:sldId id="256" r:id="rId2"/>
@@ -16,12 +16,18 @@
     <p:sldId id="260" r:id="rId7"/>
     <p:sldId id="261" r:id="rId8"/>
     <p:sldId id="262" r:id="rId9"/>
-    <p:sldId id="270" r:id="rId10"/>
-    <p:sldId id="265" r:id="rId11"/>
-    <p:sldId id="266" r:id="rId12"/>
-    <p:sldId id="264" r:id="rId13"/>
-    <p:sldId id="267" r:id="rId14"/>
-    <p:sldId id="268" r:id="rId15"/>
+    <p:sldId id="271" r:id="rId10"/>
+    <p:sldId id="270" r:id="rId11"/>
+    <p:sldId id="265" r:id="rId12"/>
+    <p:sldId id="266" r:id="rId13"/>
+    <p:sldId id="264" r:id="rId14"/>
+    <p:sldId id="267" r:id="rId15"/>
+    <p:sldId id="268" r:id="rId16"/>
+    <p:sldId id="272" r:id="rId17"/>
+    <p:sldId id="276" r:id="rId18"/>
+    <p:sldId id="274" r:id="rId19"/>
+    <p:sldId id="273" r:id="rId20"/>
+    <p:sldId id="275" r:id="rId21"/>
   </p:sldIdLst>
   <p:sldSz cx="12192000" cy="6858000"/>
   <p:notesSz cx="6858000" cy="9144000"/>
@@ -213,7 +219,7 @@
           <a:p>
             <a:fld id="{0386247E-E161-4A7D-8414-A680043B480C}" type="datetimeFigureOut">
               <a:rPr lang="en-US" smtClean="0"/>
-              <a:t>9/6/2018</a:t>
+              <a:t>9/10/2018</a:t>
             </a:fld>
             <a:endParaRPr lang="en-US"/>
           </a:p>
@@ -1134,7 +1140,7 @@
           <a:p>
             <a:fld id="{71459950-B371-40CC-BAFD-4CFF20F72272}" type="datetimeFigureOut">
               <a:rPr lang="en-US" smtClean="0"/>
-              <a:t>9/6/2018</a:t>
+              <a:t>9/10/2018</a:t>
             </a:fld>
             <a:endParaRPr lang="en-US"/>
           </a:p>
@@ -1332,7 +1338,7 @@
           <a:p>
             <a:fld id="{71459950-B371-40CC-BAFD-4CFF20F72272}" type="datetimeFigureOut">
               <a:rPr lang="en-US" smtClean="0"/>
-              <a:t>9/6/2018</a:t>
+              <a:t>9/10/2018</a:t>
             </a:fld>
             <a:endParaRPr lang="en-US"/>
           </a:p>
@@ -1540,7 +1546,7 @@
           <a:p>
             <a:fld id="{71459950-B371-40CC-BAFD-4CFF20F72272}" type="datetimeFigureOut">
               <a:rPr lang="en-US" smtClean="0"/>
-              <a:t>9/6/2018</a:t>
+              <a:t>9/10/2018</a:t>
             </a:fld>
             <a:endParaRPr lang="en-US"/>
           </a:p>
@@ -1738,7 +1744,7 @@
           <a:p>
             <a:fld id="{71459950-B371-40CC-BAFD-4CFF20F72272}" type="datetimeFigureOut">
               <a:rPr lang="en-US" smtClean="0"/>
-              <a:t>9/6/2018</a:t>
+              <a:t>9/10/2018</a:t>
             </a:fld>
             <a:endParaRPr lang="en-US"/>
           </a:p>
@@ -2013,7 +2019,7 @@
           <a:p>
             <a:fld id="{71459950-B371-40CC-BAFD-4CFF20F72272}" type="datetimeFigureOut">
               <a:rPr lang="en-US" smtClean="0"/>
-              <a:t>9/6/2018</a:t>
+              <a:t>9/10/2018</a:t>
             </a:fld>
             <a:endParaRPr lang="en-US"/>
           </a:p>
@@ -2278,7 +2284,7 @@
           <a:p>
             <a:fld id="{71459950-B371-40CC-BAFD-4CFF20F72272}" type="datetimeFigureOut">
               <a:rPr lang="en-US" smtClean="0"/>
-              <a:t>9/6/2018</a:t>
+              <a:t>9/10/2018</a:t>
             </a:fld>
             <a:endParaRPr lang="en-US"/>
           </a:p>
@@ -2690,7 +2696,7 @@
           <a:p>
             <a:fld id="{71459950-B371-40CC-BAFD-4CFF20F72272}" type="datetimeFigureOut">
               <a:rPr lang="en-US" smtClean="0"/>
-              <a:t>9/6/2018</a:t>
+              <a:t>9/10/2018</a:t>
             </a:fld>
             <a:endParaRPr lang="en-US"/>
           </a:p>
@@ -2831,7 +2837,7 @@
           <a:p>
             <a:fld id="{71459950-B371-40CC-BAFD-4CFF20F72272}" type="datetimeFigureOut">
               <a:rPr lang="en-US" smtClean="0"/>
-              <a:t>9/6/2018</a:t>
+              <a:t>9/10/2018</a:t>
             </a:fld>
             <a:endParaRPr lang="en-US"/>
           </a:p>
@@ -2944,7 +2950,7 @@
           <a:p>
             <a:fld id="{71459950-B371-40CC-BAFD-4CFF20F72272}" type="datetimeFigureOut">
               <a:rPr lang="en-US" smtClean="0"/>
-              <a:t>9/6/2018</a:t>
+              <a:t>9/10/2018</a:t>
             </a:fld>
             <a:endParaRPr lang="en-US"/>
           </a:p>
@@ -3255,7 +3261,7 @@
           <a:p>
             <a:fld id="{71459950-B371-40CC-BAFD-4CFF20F72272}" type="datetimeFigureOut">
               <a:rPr lang="en-US" smtClean="0"/>
-              <a:t>9/6/2018</a:t>
+              <a:t>9/10/2018</a:t>
             </a:fld>
             <a:endParaRPr lang="en-US"/>
           </a:p>
@@ -3543,7 +3549,7 @@
           <a:p>
             <a:fld id="{71459950-B371-40CC-BAFD-4CFF20F72272}" type="datetimeFigureOut">
               <a:rPr lang="en-US" smtClean="0"/>
-              <a:t>9/6/2018</a:t>
+              <a:t>9/10/2018</a:t>
             </a:fld>
             <a:endParaRPr lang="en-US"/>
           </a:p>
@@ -3784,7 +3790,7 @@
           <a:p>
             <a:fld id="{71459950-B371-40CC-BAFD-4CFF20F72272}" type="datetimeFigureOut">
               <a:rPr lang="en-US" smtClean="0"/>
-              <a:t>9/6/2018</a:t>
+              <a:t>9/10/2018</a:t>
             </a:fld>
             <a:endParaRPr lang="en-US"/>
           </a:p>
@@ -4309,7 +4315,7 @@
           <p:cNvPr id="2" name="Title 1">
             <a:extLst>
               <a:ext uri="{FF2B5EF4-FFF2-40B4-BE49-F238E27FC236}">
-                <a16:creationId xmlns:a16="http://schemas.microsoft.com/office/drawing/2014/main" id="{ECC9B202-80CE-4948-A80E-959B61F2A911}"/>
+                <a16:creationId xmlns:a16="http://schemas.microsoft.com/office/drawing/2014/main" id="{77073B25-638E-41C3-BF08-9BECE5E6D159}"/>
               </a:ext>
             </a:extLst>
           </p:cNvPr>
@@ -4327,7 +4333,7 @@
           <a:p>
             <a:r>
               <a:rPr lang="en-US" dirty="0"/>
-              <a:t>Classification</a:t>
+              <a:t>Summary of TLE Example</a:t>
             </a:r>
           </a:p>
         </p:txBody>
@@ -4337,7 +4343,7 @@
           <p:cNvPr id="3" name="Content Placeholder 2">
             <a:extLst>
               <a:ext uri="{FF2B5EF4-FFF2-40B4-BE49-F238E27FC236}">
-                <a16:creationId xmlns:a16="http://schemas.microsoft.com/office/drawing/2014/main" id="{73C5B286-A9F0-4B3E-8095-CAE1E58B7090}"/>
+                <a16:creationId xmlns:a16="http://schemas.microsoft.com/office/drawing/2014/main" id="{A6A8D6DC-1844-4471-9B01-90755151DB0C}"/>
               </a:ext>
             </a:extLst>
           </p:cNvPr>
@@ -4351,80 +4357,103 @@
         <p:spPr/>
         <p:txBody>
           <a:bodyPr>
-            <a:normAutofit fontScale="70000" lnSpcReduction="20000"/>
+            <a:normAutofit fontScale="92500" lnSpcReduction="10000"/>
           </a:bodyPr>
           <a:lstStyle/>
           <a:p>
-            <a:pPr marL="0" indent="0">
-              <a:buNone/>
-            </a:pPr>
-            <a:r>
-              <a:rPr lang="en-US" dirty="0"/>
-              <a:t>Rules of Thumb:</a:t>
-            </a:r>
-          </a:p>
-          <a:p>
-            <a:r>
-              <a:rPr lang="en-US" dirty="0"/>
-              <a:t>Avoid hand-selected/engineered features (at least initially)</a:t>
-            </a:r>
-          </a:p>
-          <a:p>
-            <a:r>
-              <a:rPr lang="en-US" dirty="0"/>
-              <a:t>Split train/test data based on some deterministic criteria</a:t>
+            <a:r>
+              <a:rPr lang="en-US" dirty="0"/>
+              <a:t>Train/Test/Validation Sets:</a:t>
             </a:r>
           </a:p>
           <a:p>
             <a:pPr lvl="1"/>
             <a:r>
               <a:rPr lang="en-US" dirty="0"/>
-              <a:t>For example, test samples are precisely those for which SAT_ID % 5 == 0. This helps to avoid accidently letting the same or equivalent examples fall into your train and test sets.</a:t>
-            </a:r>
-          </a:p>
-          <a:p>
-            <a:r>
-              <a:rPr lang="en-US" dirty="0"/>
-              <a:t>Be very careful with metrics and class imbalance.</a:t>
+              <a:t>Train: Data used to update model parameters.</a:t>
             </a:r>
           </a:p>
           <a:p>
             <a:pPr lvl="1"/>
             <a:r>
               <a:rPr lang="en-US" dirty="0"/>
-              <a:t>For example, if 95% of your data belongs to the same class, reporting a 96% accuracy needs some qualifications.</a:t>
-            </a:r>
-          </a:p>
-          <a:p>
-            <a:r>
-              <a:rPr lang="en-US" dirty="0"/>
-              <a:t>Identify a single-number metric to help simplify model comparisons.</a:t>
-            </a:r>
-          </a:p>
-          <a:p>
-            <a:r>
-              <a:rPr lang="en-US" dirty="0"/>
-              <a:t>Normalize your feature data.</a:t>
-            </a:r>
-          </a:p>
-          <a:p>
-            <a:r>
-              <a:rPr lang="en-US" dirty="0"/>
-              <a:t>Focus on the simplest version of a problem first and avoid extensive hyperparameter optimization until you can demonstrate that the most basic thing is working.</a:t>
-            </a:r>
-          </a:p>
-          <a:p>
-            <a:r>
-              <a:rPr lang="en-US" dirty="0"/>
-              <a:t>Make sure the model is learning the training data before even worrying about the test data. If your model can’t even memorize the training data well, either your problem is going to work or something else is broken.</a:t>
-            </a:r>
+              <a:t>Test: Data used to update model hyper-</a:t>
+            </a:r>
+            <a:r>
+              <a:rPr lang="en-US" dirty="0" err="1"/>
+              <a:t>parmeters</a:t>
+            </a:r>
+            <a:r>
+              <a:rPr lang="en-US" dirty="0"/>
+              <a:t>.</a:t>
+            </a:r>
+          </a:p>
+          <a:p>
+            <a:pPr lvl="1"/>
+            <a:r>
+              <a:rPr lang="en-US" dirty="0"/>
+              <a:t>Validation: Data used to measure performance of selected model.</a:t>
+            </a:r>
+          </a:p>
+          <a:p>
+            <a:r>
+              <a:rPr lang="en-US" dirty="0"/>
+              <a:t>Training Vocabulary:</a:t>
+            </a:r>
+          </a:p>
+          <a:p>
+            <a:pPr lvl="1"/>
+            <a:r>
+              <a:rPr lang="en-US" dirty="0"/>
+              <a:t>Epoch – one full pass through test train set</a:t>
+            </a:r>
+          </a:p>
+          <a:p>
+            <a:pPr lvl="1"/>
+            <a:r>
+              <a:rPr lang="en-US" dirty="0"/>
+              <a:t>Batch Size – how many examples to evaluate at once. Typically, a </a:t>
+            </a:r>
+            <a:r>
+              <a:rPr lang="en-US" dirty="0" err="1"/>
+              <a:t>gradiant</a:t>
+            </a:r>
+            <a:r>
+              <a:rPr lang="en-US" dirty="0"/>
+              <a:t> is computed on this data.</a:t>
+            </a:r>
+          </a:p>
+          <a:p>
+            <a:pPr lvl="1"/>
+            <a:r>
+              <a:rPr lang="en-US" dirty="0"/>
+              <a:t>Loss – </a:t>
+            </a:r>
+            <a:r>
+              <a:rPr lang="en-US" i="1" dirty="0"/>
+              <a:t>differentiable</a:t>
+            </a:r>
+            <a:r>
+              <a:rPr lang="en-US" dirty="0"/>
+              <a:t> function comparing predictions and targets: model(x) vs y.</a:t>
+            </a:r>
+          </a:p>
+          <a:p>
+            <a:pPr lvl="1"/>
+            <a:r>
+              <a:rPr lang="en-US" dirty="0"/>
+              <a:t>Stochastic Gradient Descent (SGD) – the algorithm for efficiently updating model parameters by computing partial derivatives of loss(model(x), y) over a batch of samples.</a:t>
+            </a:r>
+          </a:p>
+          <a:p>
+            <a:endParaRPr lang="en-US" dirty="0"/>
           </a:p>
         </p:txBody>
       </p:sp>
     </p:spTree>
     <p:extLst>
       <p:ext uri="{BB962C8B-B14F-4D97-AF65-F5344CB8AC3E}">
-        <p14:creationId xmlns:p14="http://schemas.microsoft.com/office/powerpoint/2010/main" val="1812924170"/>
+        <p14:creationId xmlns:p14="http://schemas.microsoft.com/office/powerpoint/2010/main" val="3459832265"/>
       </p:ext>
     </p:extLst>
   </p:cSld>
@@ -4456,7 +4485,7 @@
           <p:cNvPr id="2" name="Title 1">
             <a:extLst>
               <a:ext uri="{FF2B5EF4-FFF2-40B4-BE49-F238E27FC236}">
-                <a16:creationId xmlns:a16="http://schemas.microsoft.com/office/drawing/2014/main" id="{0E22603D-14F1-4117-A473-59E0C22862C3}"/>
+                <a16:creationId xmlns:a16="http://schemas.microsoft.com/office/drawing/2014/main" id="{ECC9B202-80CE-4948-A80E-959B61F2A911}"/>
               </a:ext>
             </a:extLst>
           </p:cNvPr>
@@ -4474,40 +4503,101 @@
           <a:p>
             <a:r>
               <a:rPr lang="en-US" dirty="0"/>
-              <a:t>Convolutional Neural Networks</a:t>
-            </a:r>
-          </a:p>
-        </p:txBody>
-      </p:sp>
-      <p:sp>
-        <p:nvSpPr>
-          <p:cNvPr id="5" name="Text Placeholder 4">
-            <a:extLst>
-              <a:ext uri="{FF2B5EF4-FFF2-40B4-BE49-F238E27FC236}">
-                <a16:creationId xmlns:a16="http://schemas.microsoft.com/office/drawing/2014/main" id="{ABC9E725-B1B7-45D9-9C9A-5C7785D16D7B}"/>
-              </a:ext>
-            </a:extLst>
-          </p:cNvPr>
-          <p:cNvSpPr>
-            <a:spLocks noGrp="1"/>
-          </p:cNvSpPr>
-          <p:nvPr>
-            <p:ph type="body" idx="1"/>
-          </p:nvPr>
-        </p:nvSpPr>
-        <p:spPr/>
-        <p:txBody>
-          <a:bodyPr/>
-          <a:lstStyle/>
-          <a:p>
-            <a:endParaRPr lang="en-US"/>
+              <a:t>Summary of TLE Example</a:t>
+            </a:r>
+          </a:p>
+        </p:txBody>
+      </p:sp>
+      <p:sp>
+        <p:nvSpPr>
+          <p:cNvPr id="3" name="Content Placeholder 2">
+            <a:extLst>
+              <a:ext uri="{FF2B5EF4-FFF2-40B4-BE49-F238E27FC236}">
+                <a16:creationId xmlns:a16="http://schemas.microsoft.com/office/drawing/2014/main" id="{73C5B286-A9F0-4B3E-8095-CAE1E58B7090}"/>
+              </a:ext>
+            </a:extLst>
+          </p:cNvPr>
+          <p:cNvSpPr>
+            <a:spLocks noGrp="1"/>
+          </p:cNvSpPr>
+          <p:nvPr>
+            <p:ph idx="1"/>
+          </p:nvPr>
+        </p:nvSpPr>
+        <p:spPr/>
+        <p:txBody>
+          <a:bodyPr>
+            <a:normAutofit fontScale="62500" lnSpcReduction="20000"/>
+          </a:bodyPr>
+          <a:lstStyle/>
+          <a:p>
+            <a:r>
+              <a:rPr lang="en-US" dirty="0"/>
+              <a:t>Avoid hand-selected/engineered features (at least initially)</a:t>
+            </a:r>
+          </a:p>
+          <a:p>
+            <a:r>
+              <a:rPr lang="en-US" dirty="0"/>
+              <a:t>Split train/test data based on some deterministic criteria</a:t>
+            </a:r>
+          </a:p>
+          <a:p>
+            <a:pPr lvl="1"/>
+            <a:r>
+              <a:rPr lang="en-US" dirty="0"/>
+              <a:t>For example, test samples are precisely those for which SAT_ID % 5 == 0. This helps to avoid accidently letting the same or equivalent examples fall into your train and test sets.</a:t>
+            </a:r>
+          </a:p>
+          <a:p>
+            <a:r>
+              <a:rPr lang="en-US" dirty="0"/>
+              <a:t>Be very careful with metrics and class imbalance.</a:t>
+            </a:r>
+          </a:p>
+          <a:p>
+            <a:pPr lvl="1"/>
+            <a:r>
+              <a:rPr lang="en-US" dirty="0"/>
+              <a:t>For example, if 95% of your data belongs to the same class, reporting a 96% accuracy needs some qualifications.</a:t>
+            </a:r>
+          </a:p>
+          <a:p>
+            <a:r>
+              <a:rPr lang="en-US" dirty="0"/>
+              <a:t>Identify a single-number metric to help simplify model comparisons.</a:t>
+            </a:r>
+          </a:p>
+          <a:p>
+            <a:r>
+              <a:rPr lang="en-US" dirty="0"/>
+              <a:t>Normalize your feature data.</a:t>
+            </a:r>
+          </a:p>
+          <a:p>
+            <a:r>
+              <a:rPr lang="en-US" dirty="0"/>
+              <a:t>Focus on the simplest version of a problem first and avoid extensive hyperparameter optimization until you can demonstrate that the most basic thing is working.</a:t>
+            </a:r>
+          </a:p>
+          <a:p>
+            <a:r>
+              <a:rPr lang="en-US" dirty="0"/>
+              <a:t>Make sure the model is learning the training data before even worrying about the test data. If your model can’t even memorize the training data well, either your problem is going to work or something else is broken.</a:t>
+            </a:r>
+          </a:p>
+          <a:p>
+            <a:r>
+              <a:rPr lang="en-US" dirty="0"/>
+              <a:t>Even if you’re monitoring accuracy, looking at a confusion matrix is almost always helpful to understand how your model is performing.</a:t>
+            </a:r>
           </a:p>
         </p:txBody>
       </p:sp>
     </p:spTree>
     <p:extLst>
       <p:ext uri="{BB962C8B-B14F-4D97-AF65-F5344CB8AC3E}">
-        <p14:creationId xmlns:p14="http://schemas.microsoft.com/office/powerpoint/2010/main" val="4180393728"/>
+        <p14:creationId xmlns:p14="http://schemas.microsoft.com/office/powerpoint/2010/main" val="1812924170"/>
       </p:ext>
     </p:extLst>
   </p:cSld>
@@ -4534,6 +4624,89 @@
           <a:chExt cx="0" cy="0"/>
         </a:xfrm>
       </p:grpSpPr>
+      <p:sp>
+        <p:nvSpPr>
+          <p:cNvPr id="2" name="Title 1">
+            <a:extLst>
+              <a:ext uri="{FF2B5EF4-FFF2-40B4-BE49-F238E27FC236}">
+                <a16:creationId xmlns:a16="http://schemas.microsoft.com/office/drawing/2014/main" id="{0E22603D-14F1-4117-A473-59E0C22862C3}"/>
+              </a:ext>
+            </a:extLst>
+          </p:cNvPr>
+          <p:cNvSpPr>
+            <a:spLocks noGrp="1"/>
+          </p:cNvSpPr>
+          <p:nvPr>
+            <p:ph type="title"/>
+          </p:nvPr>
+        </p:nvSpPr>
+        <p:spPr/>
+        <p:txBody>
+          <a:bodyPr/>
+          <a:lstStyle/>
+          <a:p>
+            <a:r>
+              <a:rPr lang="en-US" dirty="0"/>
+              <a:t>Convolutional Neural Networks</a:t>
+            </a:r>
+          </a:p>
+        </p:txBody>
+      </p:sp>
+      <p:sp>
+        <p:nvSpPr>
+          <p:cNvPr id="5" name="Text Placeholder 4">
+            <a:extLst>
+              <a:ext uri="{FF2B5EF4-FFF2-40B4-BE49-F238E27FC236}">
+                <a16:creationId xmlns:a16="http://schemas.microsoft.com/office/drawing/2014/main" id="{ABC9E725-B1B7-45D9-9C9A-5C7785D16D7B}"/>
+              </a:ext>
+            </a:extLst>
+          </p:cNvPr>
+          <p:cNvSpPr>
+            <a:spLocks noGrp="1"/>
+          </p:cNvSpPr>
+          <p:nvPr>
+            <p:ph type="body" idx="1"/>
+          </p:nvPr>
+        </p:nvSpPr>
+        <p:spPr/>
+        <p:txBody>
+          <a:bodyPr/>
+          <a:lstStyle/>
+          <a:p>
+            <a:endParaRPr lang="en-US"/>
+          </a:p>
+        </p:txBody>
+      </p:sp>
+    </p:spTree>
+    <p:extLst>
+      <p:ext uri="{BB962C8B-B14F-4D97-AF65-F5344CB8AC3E}">
+        <p14:creationId xmlns:p14="http://schemas.microsoft.com/office/powerpoint/2010/main" val="4180393728"/>
+      </p:ext>
+    </p:extLst>
+  </p:cSld>
+  <p:clrMapOvr>
+    <a:masterClrMapping/>
+  </p:clrMapOvr>
+</p:sld>
+</file>
+
+<file path=ppt/slides/slide13.xml><?xml version="1.0" encoding="utf-8"?>
+<p:sld xmlns:a="http://schemas.openxmlformats.org/drawingml/2006/main" xmlns:r="http://schemas.openxmlformats.org/officeDocument/2006/relationships" xmlns:p="http://schemas.openxmlformats.org/presentationml/2006/main">
+  <p:cSld>
+    <p:spTree>
+      <p:nvGrpSpPr>
+        <p:cNvPr id="1" name=""/>
+        <p:cNvGrpSpPr/>
+        <p:nvPr/>
+      </p:nvGrpSpPr>
+      <p:grpSpPr>
+        <a:xfrm>
+          <a:off x="0" y="0"/>
+          <a:ext cx="0" cy="0"/>
+          <a:chOff x="0" y="0"/>
+          <a:chExt cx="0" cy="0"/>
+        </a:xfrm>
+      </p:grpSpPr>
       <p:pic>
         <p:nvPicPr>
           <p:cNvPr id="9" name="Content Placeholder 8" descr="A picture containing tree&#10;&#10;Description generated with very high confidence">
@@ -4625,7 +4798,7 @@
 </p:sld>
 </file>
 
-<file path=ppt/slides/slide13.xml><?xml version="1.0" encoding="utf-8"?>
+<file path=ppt/slides/slide14.xml><?xml version="1.0" encoding="utf-8"?>
 <p:sld xmlns:a="http://schemas.openxmlformats.org/drawingml/2006/main" xmlns:r="http://schemas.openxmlformats.org/officeDocument/2006/relationships" xmlns:p="http://schemas.openxmlformats.org/presentationml/2006/main">
   <p:cSld>
     <p:spTree>
@@ -4751,7 +4924,7 @@
 </p:sld>
 </file>
 
-<file path=ppt/slides/slide14.xml><?xml version="1.0" encoding="utf-8"?>
+<file path=ppt/slides/slide15.xml><?xml version="1.0" encoding="utf-8"?>
 <p:sld xmlns:a="http://schemas.openxmlformats.org/drawingml/2006/main" xmlns:r="http://schemas.openxmlformats.org/officeDocument/2006/relationships" xmlns:p="http://schemas.openxmlformats.org/presentationml/2006/main">
   <p:cSld>
     <p:spTree>
@@ -4791,7 +4964,7 @@
           <a:p>
             <a:r>
               <a:rPr lang="en-US" dirty="0"/>
-              <a:t>1D – CNN Diagram Goes Here</a:t>
+              <a:t>Convolutional Neural Networks</a:t>
             </a:r>
           </a:p>
         </p:txBody>
@@ -4817,7 +4990,16 @@
           <a:bodyPr/>
           <a:lstStyle/>
           <a:p>
-            <a:endParaRPr lang="en-US" dirty="0"/>
+            <a:r>
+              <a:rPr lang="en-US" dirty="0"/>
+              <a:t>Discuss CNN Diagram</a:t>
+            </a:r>
+          </a:p>
+          <a:p>
+            <a:r>
+              <a:rPr lang="en-US" dirty="0"/>
+              <a:t>Switch to Asteroid Light Curve Notebook – Part 1</a:t>
+            </a:r>
           </a:p>
         </p:txBody>
       </p:sp>
@@ -4825,6 +5007,477 @@
     <p:extLst>
       <p:ext uri="{BB962C8B-B14F-4D97-AF65-F5344CB8AC3E}">
         <p14:creationId xmlns:p14="http://schemas.microsoft.com/office/powerpoint/2010/main" val="310687986"/>
+      </p:ext>
+    </p:extLst>
+  </p:cSld>
+  <p:clrMapOvr>
+    <a:masterClrMapping/>
+  </p:clrMapOvr>
+</p:sld>
+</file>
+
+<file path=ppt/slides/slide16.xml><?xml version="1.0" encoding="utf-8"?>
+<p:sld xmlns:a="http://schemas.openxmlformats.org/drawingml/2006/main" xmlns:r="http://schemas.openxmlformats.org/officeDocument/2006/relationships" xmlns:p="http://schemas.openxmlformats.org/presentationml/2006/main">
+  <p:cSld>
+    <p:spTree>
+      <p:nvGrpSpPr>
+        <p:cNvPr id="1" name=""/>
+        <p:cNvGrpSpPr/>
+        <p:nvPr/>
+      </p:nvGrpSpPr>
+      <p:grpSpPr>
+        <a:xfrm>
+          <a:off x="0" y="0"/>
+          <a:ext cx="0" cy="0"/>
+          <a:chOff x="0" y="0"/>
+          <a:chExt cx="0" cy="0"/>
+        </a:xfrm>
+      </p:grpSpPr>
+      <p:sp>
+        <p:nvSpPr>
+          <p:cNvPr id="2" name="Title 1">
+            <a:extLst>
+              <a:ext uri="{FF2B5EF4-FFF2-40B4-BE49-F238E27FC236}">
+                <a16:creationId xmlns:a16="http://schemas.microsoft.com/office/drawing/2014/main" id="{FE343CA8-8A30-43B6-9041-A5E886103ABB}"/>
+              </a:ext>
+            </a:extLst>
+          </p:cNvPr>
+          <p:cNvSpPr>
+            <a:spLocks noGrp="1"/>
+          </p:cNvSpPr>
+          <p:nvPr>
+            <p:ph type="title"/>
+          </p:nvPr>
+        </p:nvSpPr>
+        <p:spPr/>
+        <p:txBody>
+          <a:bodyPr/>
+          <a:lstStyle/>
+          <a:p>
+            <a:r>
+              <a:rPr lang="en-US" dirty="0"/>
+              <a:t>Summary of Asteroid Example</a:t>
+            </a:r>
+          </a:p>
+        </p:txBody>
+      </p:sp>
+      <p:sp>
+        <p:nvSpPr>
+          <p:cNvPr id="3" name="Content Placeholder 2">
+            <a:extLst>
+              <a:ext uri="{FF2B5EF4-FFF2-40B4-BE49-F238E27FC236}">
+                <a16:creationId xmlns:a16="http://schemas.microsoft.com/office/drawing/2014/main" id="{0A8CCDB2-4F60-4C1D-B794-2845EBFA060A}"/>
+              </a:ext>
+            </a:extLst>
+          </p:cNvPr>
+          <p:cNvSpPr>
+            <a:spLocks noGrp="1"/>
+          </p:cNvSpPr>
+          <p:nvPr>
+            <p:ph idx="1"/>
+          </p:nvPr>
+        </p:nvSpPr>
+        <p:spPr/>
+        <p:txBody>
+          <a:bodyPr>
+            <a:normAutofit fontScale="92500" lnSpcReduction="20000"/>
+          </a:bodyPr>
+          <a:lstStyle/>
+          <a:p>
+            <a:r>
+              <a:rPr lang="en-US" dirty="0"/>
+              <a:t>Outside knowledge about the structure of your data can greatly improve model performance and/or training speed.</a:t>
+            </a:r>
+          </a:p>
+          <a:p>
+            <a:r>
+              <a:rPr lang="en-US" dirty="0"/>
+              <a:t>Helpful to have a baseline model for comparison. This could be:</a:t>
+            </a:r>
+          </a:p>
+          <a:p>
+            <a:pPr lvl="1"/>
+            <a:r>
+              <a:rPr lang="en-US" dirty="0"/>
+              <a:t>A “classical” ML algorithm like logistic regression or SVM.</a:t>
+            </a:r>
+          </a:p>
+          <a:p>
+            <a:pPr lvl="1"/>
+            <a:r>
+              <a:rPr lang="en-US" dirty="0"/>
+              <a:t>A non-ML algorithm already being used to solve the problem.</a:t>
+            </a:r>
+          </a:p>
+          <a:p>
+            <a:pPr lvl="1"/>
+            <a:r>
+              <a:rPr lang="en-US" dirty="0"/>
+              <a:t>How well a human can solve the problem (objective or subjective).</a:t>
+            </a:r>
+          </a:p>
+          <a:p>
+            <a:pPr lvl="1"/>
+            <a:r>
+              <a:rPr lang="en-US" dirty="0"/>
+              <a:t>How well a human says an algorithm would need to perform for them to find it useful.</a:t>
+            </a:r>
+          </a:p>
+          <a:p>
+            <a:r>
+              <a:rPr lang="en-US" dirty="0"/>
+              <a:t>Helpful to understand how a random model or a model that has only learned the background distribution will perform.</a:t>
+            </a:r>
+          </a:p>
+          <a:p>
+            <a:r>
+              <a:rPr lang="en-US" dirty="0"/>
+              <a:t>Neural networks can be adaptable to multi-modal input.</a:t>
+            </a:r>
+          </a:p>
+          <a:p>
+            <a:pPr lvl="1"/>
+            <a:r>
+              <a:rPr lang="en-US" dirty="0"/>
+              <a:t>Combining different types of data into an analytic model can quickly become intractable, but it is fairly straightforward for a neural network.</a:t>
+            </a:r>
+          </a:p>
+        </p:txBody>
+      </p:sp>
+    </p:spTree>
+    <p:extLst>
+      <p:ext uri="{BB962C8B-B14F-4D97-AF65-F5344CB8AC3E}">
+        <p14:creationId xmlns:p14="http://schemas.microsoft.com/office/powerpoint/2010/main" val="956687152"/>
+      </p:ext>
+    </p:extLst>
+  </p:cSld>
+  <p:clrMapOvr>
+    <a:masterClrMapping/>
+  </p:clrMapOvr>
+</p:sld>
+</file>
+
+<file path=ppt/slides/slide17.xml><?xml version="1.0" encoding="utf-8"?>
+<p:sld xmlns:a="http://schemas.openxmlformats.org/drawingml/2006/main" xmlns:r="http://schemas.openxmlformats.org/officeDocument/2006/relationships" xmlns:p="http://schemas.openxmlformats.org/presentationml/2006/main">
+  <p:cSld>
+    <p:spTree>
+      <p:nvGrpSpPr>
+        <p:cNvPr id="1" name=""/>
+        <p:cNvGrpSpPr/>
+        <p:nvPr/>
+      </p:nvGrpSpPr>
+      <p:grpSpPr>
+        <a:xfrm>
+          <a:off x="0" y="0"/>
+          <a:ext cx="0" cy="0"/>
+          <a:chOff x="0" y="0"/>
+          <a:chExt cx="0" cy="0"/>
+        </a:xfrm>
+      </p:grpSpPr>
+      <p:sp>
+        <p:nvSpPr>
+          <p:cNvPr id="2" name="Title 1">
+            <a:extLst>
+              <a:ext uri="{FF2B5EF4-FFF2-40B4-BE49-F238E27FC236}">
+                <a16:creationId xmlns:a16="http://schemas.microsoft.com/office/drawing/2014/main" id="{BE5D167A-BA5F-4E1E-B73A-020C294F83D2}"/>
+              </a:ext>
+            </a:extLst>
+          </p:cNvPr>
+          <p:cNvSpPr>
+            <a:spLocks noGrp="1"/>
+          </p:cNvSpPr>
+          <p:nvPr>
+            <p:ph type="title"/>
+          </p:nvPr>
+        </p:nvSpPr>
+        <p:spPr/>
+        <p:txBody>
+          <a:bodyPr/>
+          <a:lstStyle/>
+          <a:p>
+            <a:r>
+              <a:rPr lang="en-US" dirty="0"/>
+              <a:t>Hard Lessons about Data</a:t>
+            </a:r>
+          </a:p>
+        </p:txBody>
+      </p:sp>
+      <p:sp>
+        <p:nvSpPr>
+          <p:cNvPr id="3" name="Content Placeholder 2">
+            <a:extLst>
+              <a:ext uri="{FF2B5EF4-FFF2-40B4-BE49-F238E27FC236}">
+                <a16:creationId xmlns:a16="http://schemas.microsoft.com/office/drawing/2014/main" id="{FE7D8CE4-1296-4413-8BD9-C408F76A694A}"/>
+              </a:ext>
+            </a:extLst>
+          </p:cNvPr>
+          <p:cNvSpPr>
+            <a:spLocks noGrp="1"/>
+          </p:cNvSpPr>
+          <p:nvPr>
+            <p:ph idx="1"/>
+          </p:nvPr>
+        </p:nvSpPr>
+        <p:spPr/>
+        <p:txBody>
+          <a:bodyPr>
+            <a:normAutofit/>
+          </a:bodyPr>
+          <a:lstStyle/>
+          <a:p>
+            <a:r>
+              <a:rPr lang="en-US" dirty="0"/>
+              <a:t>Be very suspicious of your data.</a:t>
+            </a:r>
+          </a:p>
+          <a:p>
+            <a:r>
+              <a:rPr lang="en-US" dirty="0"/>
+              <a:t>Be very suspicious of people who give you data.</a:t>
+            </a:r>
+          </a:p>
+          <a:p>
+            <a:pPr lvl="1"/>
+            <a:r>
+              <a:rPr lang="en-US" dirty="0"/>
+              <a:t>It’s easy to overlook biases in your data that were never a problem when humans or non-adaptive algorithms were the primary consumers of it.</a:t>
+            </a:r>
+          </a:p>
+          <a:p>
+            <a:r>
+              <a:rPr lang="en-US" dirty="0"/>
+              <a:t>When a model is working well, your first thought should be that you’ve done at least one of the following:</a:t>
+            </a:r>
+          </a:p>
+          <a:p>
+            <a:pPr lvl="1"/>
+            <a:r>
+              <a:rPr lang="en-US" dirty="0"/>
+              <a:t>Misunderstood your class imbalance (e.g. Case 1 is 95% of your data)</a:t>
+            </a:r>
+          </a:p>
+          <a:p>
+            <a:pPr lvl="1"/>
+            <a:r>
+              <a:rPr lang="en-US" dirty="0"/>
+              <a:t>Contaminated your test data with training data</a:t>
+            </a:r>
+          </a:p>
+          <a:p>
+            <a:pPr lvl="1"/>
+            <a:r>
+              <a:rPr lang="en-US" dirty="0"/>
+              <a:t>Included some “feature” that amounts to cheating (e.g. Included the target values as features)</a:t>
+            </a:r>
+          </a:p>
+        </p:txBody>
+      </p:sp>
+    </p:spTree>
+    <p:extLst>
+      <p:ext uri="{BB962C8B-B14F-4D97-AF65-F5344CB8AC3E}">
+        <p14:creationId xmlns:p14="http://schemas.microsoft.com/office/powerpoint/2010/main" val="1301541444"/>
+      </p:ext>
+    </p:extLst>
+  </p:cSld>
+  <p:clrMapOvr>
+    <a:masterClrMapping/>
+  </p:clrMapOvr>
+</p:sld>
+</file>
+
+<file path=ppt/slides/slide18.xml><?xml version="1.0" encoding="utf-8"?>
+<p:sld xmlns:a="http://schemas.openxmlformats.org/drawingml/2006/main" xmlns:r="http://schemas.openxmlformats.org/officeDocument/2006/relationships" xmlns:p="http://schemas.openxmlformats.org/presentationml/2006/main">
+  <p:cSld>
+    <p:spTree>
+      <p:nvGrpSpPr>
+        <p:cNvPr id="1" name=""/>
+        <p:cNvGrpSpPr/>
+        <p:nvPr/>
+      </p:nvGrpSpPr>
+      <p:grpSpPr>
+        <a:xfrm>
+          <a:off x="0" y="0"/>
+          <a:ext cx="0" cy="0"/>
+          <a:chOff x="0" y="0"/>
+          <a:chExt cx="0" cy="0"/>
+        </a:xfrm>
+      </p:grpSpPr>
+      <p:sp>
+        <p:nvSpPr>
+          <p:cNvPr id="2" name="Title 1">
+            <a:extLst>
+              <a:ext uri="{FF2B5EF4-FFF2-40B4-BE49-F238E27FC236}">
+                <a16:creationId xmlns:a16="http://schemas.microsoft.com/office/drawing/2014/main" id="{58531ADF-980A-4614-B1D4-FAA80623545D}"/>
+              </a:ext>
+            </a:extLst>
+          </p:cNvPr>
+          <p:cNvSpPr>
+            <a:spLocks noGrp="1"/>
+          </p:cNvSpPr>
+          <p:nvPr>
+            <p:ph type="title"/>
+          </p:nvPr>
+        </p:nvSpPr>
+        <p:spPr/>
+        <p:txBody>
+          <a:bodyPr/>
+          <a:lstStyle/>
+          <a:p>
+            <a:r>
+              <a:rPr lang="en-US" dirty="0"/>
+              <a:t>Unsupervised Learning</a:t>
+            </a:r>
+          </a:p>
+        </p:txBody>
+      </p:sp>
+      <p:sp>
+        <p:nvSpPr>
+          <p:cNvPr id="3" name="Text Placeholder 2">
+            <a:extLst>
+              <a:ext uri="{FF2B5EF4-FFF2-40B4-BE49-F238E27FC236}">
+                <a16:creationId xmlns:a16="http://schemas.microsoft.com/office/drawing/2014/main" id="{16B85D8F-DCD6-4CF6-A4D4-6EEED3DC411D}"/>
+              </a:ext>
+            </a:extLst>
+          </p:cNvPr>
+          <p:cNvSpPr>
+            <a:spLocks noGrp="1"/>
+          </p:cNvSpPr>
+          <p:nvPr>
+            <p:ph type="body" idx="1"/>
+          </p:nvPr>
+        </p:nvSpPr>
+        <p:spPr/>
+        <p:txBody>
+          <a:bodyPr/>
+          <a:lstStyle/>
+          <a:p>
+            <a:endParaRPr lang="en-US" dirty="0"/>
+          </a:p>
+        </p:txBody>
+      </p:sp>
+    </p:spTree>
+    <p:extLst>
+      <p:ext uri="{BB962C8B-B14F-4D97-AF65-F5344CB8AC3E}">
+        <p14:creationId xmlns:p14="http://schemas.microsoft.com/office/powerpoint/2010/main" val="363634226"/>
+      </p:ext>
+    </p:extLst>
+  </p:cSld>
+  <p:clrMapOvr>
+    <a:masterClrMapping/>
+  </p:clrMapOvr>
+</p:sld>
+</file>
+
+<file path=ppt/slides/slide19.xml><?xml version="1.0" encoding="utf-8"?>
+<p:sld xmlns:a="http://schemas.openxmlformats.org/drawingml/2006/main" xmlns:r="http://schemas.openxmlformats.org/officeDocument/2006/relationships" xmlns:p="http://schemas.openxmlformats.org/presentationml/2006/main">
+  <p:cSld>
+    <p:spTree>
+      <p:nvGrpSpPr>
+        <p:cNvPr id="1" name=""/>
+        <p:cNvGrpSpPr/>
+        <p:nvPr/>
+      </p:nvGrpSpPr>
+      <p:grpSpPr>
+        <a:xfrm>
+          <a:off x="0" y="0"/>
+          <a:ext cx="0" cy="0"/>
+          <a:chOff x="0" y="0"/>
+          <a:chExt cx="0" cy="0"/>
+        </a:xfrm>
+      </p:grpSpPr>
+      <p:sp>
+        <p:nvSpPr>
+          <p:cNvPr id="2" name="Title 1">
+            <a:extLst>
+              <a:ext uri="{FF2B5EF4-FFF2-40B4-BE49-F238E27FC236}">
+                <a16:creationId xmlns:a16="http://schemas.microsoft.com/office/drawing/2014/main" id="{2DA34F3F-9BA6-4DFB-AEB3-28763AEB0D11}"/>
+              </a:ext>
+            </a:extLst>
+          </p:cNvPr>
+          <p:cNvSpPr>
+            <a:spLocks noGrp="1"/>
+          </p:cNvSpPr>
+          <p:nvPr>
+            <p:ph type="title"/>
+          </p:nvPr>
+        </p:nvSpPr>
+        <p:spPr/>
+        <p:txBody>
+          <a:bodyPr/>
+          <a:lstStyle/>
+          <a:p>
+            <a:r>
+              <a:rPr lang="en-US" dirty="0"/>
+              <a:t>Unsupervised Learning</a:t>
+            </a:r>
+          </a:p>
+        </p:txBody>
+      </p:sp>
+      <p:sp>
+        <p:nvSpPr>
+          <p:cNvPr id="3" name="Content Placeholder 2">
+            <a:extLst>
+              <a:ext uri="{FF2B5EF4-FFF2-40B4-BE49-F238E27FC236}">
+                <a16:creationId xmlns:a16="http://schemas.microsoft.com/office/drawing/2014/main" id="{31C81AE3-651E-4EDB-964E-926805B4DE16}"/>
+              </a:ext>
+            </a:extLst>
+          </p:cNvPr>
+          <p:cNvSpPr>
+            <a:spLocks noGrp="1"/>
+          </p:cNvSpPr>
+          <p:nvPr>
+            <p:ph idx="1"/>
+          </p:nvPr>
+        </p:nvSpPr>
+        <p:spPr/>
+        <p:txBody>
+          <a:bodyPr/>
+          <a:lstStyle/>
+          <a:p>
+            <a:r>
+              <a:rPr lang="en-US" dirty="0"/>
+              <a:t>Supervised learning uses known target values and a differentiable loss function to drive learning.</a:t>
+            </a:r>
+          </a:p>
+          <a:p>
+            <a:r>
+              <a:rPr lang="en-US" dirty="0"/>
+              <a:t>However, we often have:</a:t>
+            </a:r>
+          </a:p>
+          <a:p>
+            <a:pPr lvl="1"/>
+            <a:r>
+              <a:rPr lang="en-US" dirty="0"/>
+              <a:t>Few or no target values because they are difficult/expensive to collect.</a:t>
+            </a:r>
+          </a:p>
+          <a:p>
+            <a:pPr lvl="1"/>
+            <a:r>
+              <a:rPr lang="en-US" dirty="0"/>
+              <a:t>No target values because we don’t really know what we’re looking for.</a:t>
+            </a:r>
+          </a:p>
+          <a:p>
+            <a:pPr lvl="2"/>
+            <a:r>
+              <a:rPr lang="en-US" dirty="0"/>
+              <a:t>We may suspect that there are some latent factors that explain observations but we haven’t gotten far enough to express what those factors are, much less actually measure them.</a:t>
+            </a:r>
+          </a:p>
+          <a:p>
+            <a:r>
+              <a:rPr lang="en-US" dirty="0"/>
+              <a:t>Many ML approaches to this type of problem treat it as a supervised problem by inventing some type of synthetic or surrogate target values.</a:t>
+            </a:r>
+          </a:p>
+        </p:txBody>
+      </p:sp>
+    </p:spTree>
+    <p:extLst>
+      <p:ext uri="{BB962C8B-B14F-4D97-AF65-F5344CB8AC3E}">
+        <p14:creationId xmlns:p14="http://schemas.microsoft.com/office/powerpoint/2010/main" val="1312068702"/>
       </p:ext>
     </p:extLst>
   </p:cSld>
@@ -4930,7 +5583,7 @@
             <a:pPr lvl="1"/>
             <a:r>
               <a:rPr lang="en-US" dirty="0"/>
-              <a:t>Time-Series Data: 1D-CNN and Recurrent Neural Network (RNN)</a:t>
+              <a:t>Time-Series Data: Asteroid light curve example with 1D-CNN</a:t>
             </a:r>
           </a:p>
           <a:p>
@@ -4976,6 +5629,129 @@
     <p:extLst>
       <p:ext uri="{BB962C8B-B14F-4D97-AF65-F5344CB8AC3E}">
         <p14:creationId xmlns:p14="http://schemas.microsoft.com/office/powerpoint/2010/main" val="3741631085"/>
+      </p:ext>
+    </p:extLst>
+  </p:cSld>
+  <p:clrMapOvr>
+    <a:masterClrMapping/>
+  </p:clrMapOvr>
+</p:sld>
+</file>
+
+<file path=ppt/slides/slide20.xml><?xml version="1.0" encoding="utf-8"?>
+<p:sld xmlns:a="http://schemas.openxmlformats.org/drawingml/2006/main" xmlns:r="http://schemas.openxmlformats.org/officeDocument/2006/relationships" xmlns:p="http://schemas.openxmlformats.org/presentationml/2006/main">
+  <p:cSld>
+    <p:spTree>
+      <p:nvGrpSpPr>
+        <p:cNvPr id="1" name=""/>
+        <p:cNvGrpSpPr/>
+        <p:nvPr/>
+      </p:nvGrpSpPr>
+      <p:grpSpPr>
+        <a:xfrm>
+          <a:off x="0" y="0"/>
+          <a:ext cx="0" cy="0"/>
+          <a:chOff x="0" y="0"/>
+          <a:chExt cx="0" cy="0"/>
+        </a:xfrm>
+      </p:grpSpPr>
+      <p:sp>
+        <p:nvSpPr>
+          <p:cNvPr id="2" name="Title 1">
+            <a:extLst>
+              <a:ext uri="{FF2B5EF4-FFF2-40B4-BE49-F238E27FC236}">
+                <a16:creationId xmlns:a16="http://schemas.microsoft.com/office/drawing/2014/main" id="{8D1A162E-3F8E-4A41-8BD4-549131A7FFCF}"/>
+              </a:ext>
+            </a:extLst>
+          </p:cNvPr>
+          <p:cNvSpPr>
+            <a:spLocks noGrp="1"/>
+          </p:cNvSpPr>
+          <p:nvPr>
+            <p:ph type="title"/>
+          </p:nvPr>
+        </p:nvSpPr>
+        <p:spPr/>
+        <p:txBody>
+          <a:bodyPr/>
+          <a:lstStyle/>
+          <a:p>
+            <a:r>
+              <a:rPr lang="en-US" dirty="0"/>
+              <a:t>Unsupervised Learning</a:t>
+            </a:r>
+          </a:p>
+        </p:txBody>
+      </p:sp>
+      <p:sp>
+        <p:nvSpPr>
+          <p:cNvPr id="3" name="Content Placeholder 2">
+            <a:extLst>
+              <a:ext uri="{FF2B5EF4-FFF2-40B4-BE49-F238E27FC236}">
+                <a16:creationId xmlns:a16="http://schemas.microsoft.com/office/drawing/2014/main" id="{5722717A-D242-4EAF-991D-EBDB06C18D45}"/>
+              </a:ext>
+            </a:extLst>
+          </p:cNvPr>
+          <p:cNvSpPr>
+            <a:spLocks noGrp="1"/>
+          </p:cNvSpPr>
+          <p:nvPr>
+            <p:ph idx="1"/>
+          </p:nvPr>
+        </p:nvSpPr>
+        <p:spPr/>
+        <p:txBody>
+          <a:bodyPr/>
+          <a:lstStyle/>
+          <a:p>
+            <a:r>
+              <a:rPr lang="en-US" dirty="0"/>
+              <a:t>Auto-Encoder</a:t>
+            </a:r>
+          </a:p>
+          <a:p>
+            <a:pPr lvl="1"/>
+            <a:r>
+              <a:rPr lang="en-US" dirty="0"/>
+              <a:t>Target values are the input features themselves</a:t>
+            </a:r>
+          </a:p>
+          <a:p>
+            <a:pPr lvl="1"/>
+            <a:r>
+              <a:rPr lang="en-US" dirty="0"/>
+              <a:t>Introduces a low-dimensional “pinch point” in the network</a:t>
+            </a:r>
+          </a:p>
+          <a:p>
+            <a:pPr lvl="1"/>
+            <a:r>
+              <a:rPr lang="en-US" dirty="0"/>
+              <a:t>A network able to recreate its input with high fidelity must have learned a low-dimensional representation of the data.</a:t>
+            </a:r>
+          </a:p>
+          <a:p>
+            <a:r>
+              <a:rPr lang="en-US" dirty="0"/>
+              <a:t>Unsupervised Feature Learning</a:t>
+            </a:r>
+          </a:p>
+          <a:p>
+            <a:pPr lvl="1"/>
+            <a:r>
+              <a:rPr lang="en-US" dirty="0"/>
+              <a:t>Treats unsupervised learning as a classification problem where every example is the sole representative of its own class. This can lead to many 1000s of classes.</a:t>
+            </a:r>
+          </a:p>
+          <a:p>
+            <a:endParaRPr lang="en-US" dirty="0"/>
+          </a:p>
+        </p:txBody>
+      </p:sp>
+    </p:spTree>
+    <p:extLst>
+      <p:ext uri="{BB962C8B-B14F-4D97-AF65-F5344CB8AC3E}">
+        <p14:creationId xmlns:p14="http://schemas.microsoft.com/office/powerpoint/2010/main" val="1227716121"/>
       </p:ext>
     </p:extLst>
   </p:cSld>
@@ -5053,7 +5829,7 @@
           <a:p>
             <a:r>
               <a:rPr lang="en-US" dirty="0"/>
-              <a:t>Examples are intended to help convey the workflow of a machine learning approach to a problem. They certainly aren’t intended as optimal solutions to real problems.</a:t>
+              <a:t>The following examples illustrate some common machine learning workflows. They aren’t intended as optimal solutions to real problems.</a:t>
             </a:r>
           </a:p>
           <a:p>
@@ -5062,7 +5838,7 @@
           <a:p>
             <a:r>
               <a:rPr lang="en-US" dirty="0"/>
-              <a:t>All code can be found here:</a:t>
+              <a:t>You can access the code here:</a:t>
             </a:r>
           </a:p>
           <a:p>
@@ -5076,10 +5852,25 @@
             <a:endParaRPr lang="en-US" dirty="0"/>
           </a:p>
           <a:p>
-            <a:pPr marL="457200" lvl="1" indent="0">
-              <a:buNone/>
-            </a:pPr>
-            <a:endParaRPr lang="en-US" dirty="0"/>
+            <a:pPr lvl="1"/>
+            <a:r>
+              <a:rPr lang="en-US" dirty="0"/>
+              <a:t>The examples should all be runnable once you have:</a:t>
+            </a:r>
+          </a:p>
+          <a:p>
+            <a:pPr lvl="2"/>
+            <a:r>
+              <a:rPr lang="en-US" dirty="0"/>
+              <a:t>Installed Anaconda (popular python distribution for data science and machine learning)</a:t>
+            </a:r>
+          </a:p>
+          <a:p>
+            <a:pPr lvl="2"/>
+            <a:r>
+              <a:rPr lang="en-US" dirty="0"/>
+              <a:t>Downloaded the data</a:t>
+            </a:r>
           </a:p>
         </p:txBody>
       </p:sp>
@@ -5160,7 +5951,7 @@
         <p:spPr/>
         <p:txBody>
           <a:bodyPr>
-            <a:normAutofit fontScale="85000" lnSpcReduction="20000"/>
+            <a:normAutofit fontScale="55000" lnSpcReduction="20000"/>
           </a:bodyPr>
           <a:lstStyle/>
           <a:p>
@@ -5196,6 +5987,46 @@
             <a:r>
               <a:rPr lang="en-US" dirty="0"/>
               <a:t> (apache project with Amazon support)</a:t>
+            </a:r>
+          </a:p>
+          <a:p>
+            <a:pPr marL="457200" lvl="1" indent="0">
+              <a:buNone/>
+            </a:pPr>
+            <a:endParaRPr lang="en-US" dirty="0"/>
+          </a:p>
+          <a:p>
+            <a:r>
+              <a:rPr lang="en-US" dirty="0"/>
+              <a:t>Best choice depends on your goal:</a:t>
+            </a:r>
+          </a:p>
+          <a:p>
+            <a:pPr lvl="1"/>
+            <a:r>
+              <a:rPr lang="en-US" dirty="0"/>
+              <a:t>Fundamental Research</a:t>
+            </a:r>
+          </a:p>
+          <a:p>
+            <a:pPr lvl="1"/>
+            <a:r>
+              <a:rPr lang="en-US" dirty="0"/>
+              <a:t>Proof-of-concept</a:t>
+            </a:r>
+          </a:p>
+          <a:p>
+            <a:pPr lvl="1"/>
+            <a:r>
+              <a:rPr lang="en-US" dirty="0"/>
+              <a:t>Operational Pipeline</a:t>
+            </a:r>
+          </a:p>
+          <a:p>
+            <a:pPr lvl="1"/>
+            <a:r>
+              <a:rPr lang="en-US" dirty="0"/>
+              <a:t>Deployment to Embedded System</a:t>
             </a:r>
           </a:p>
           <a:p>
@@ -5957,7 +6788,7 @@
           <p:cNvPr id="2" name="Title 1">
             <a:extLst>
               <a:ext uri="{FF2B5EF4-FFF2-40B4-BE49-F238E27FC236}">
-                <a16:creationId xmlns:a16="http://schemas.microsoft.com/office/drawing/2014/main" id="{77073B25-638E-41C3-BF08-9BECE5E6D159}"/>
+                <a16:creationId xmlns:a16="http://schemas.microsoft.com/office/drawing/2014/main" id="{1AC3C419-47A7-4BDF-A5AB-873D1EB5AA54}"/>
               </a:ext>
             </a:extLst>
           </p:cNvPr>
@@ -5975,127 +6806,15 @@
           <a:p>
             <a:r>
               <a:rPr lang="en-US" dirty="0"/>
-              <a:t>Vocabulary</a:t>
-            </a:r>
-          </a:p>
-        </p:txBody>
-      </p:sp>
-      <p:sp>
-        <p:nvSpPr>
-          <p:cNvPr id="3" name="Content Placeholder 2">
-            <a:extLst>
-              <a:ext uri="{FF2B5EF4-FFF2-40B4-BE49-F238E27FC236}">
-                <a16:creationId xmlns:a16="http://schemas.microsoft.com/office/drawing/2014/main" id="{A6A8D6DC-1844-4471-9B01-90755151DB0C}"/>
-              </a:ext>
-            </a:extLst>
-          </p:cNvPr>
-          <p:cNvSpPr>
-            <a:spLocks noGrp="1"/>
-          </p:cNvSpPr>
-          <p:nvPr>
-            <p:ph idx="1"/>
-          </p:nvPr>
-        </p:nvSpPr>
-        <p:spPr/>
-        <p:txBody>
-          <a:bodyPr>
-            <a:normAutofit fontScale="92500" lnSpcReduction="10000"/>
-          </a:bodyPr>
-          <a:lstStyle/>
-          <a:p>
-            <a:r>
-              <a:rPr lang="en-US" dirty="0"/>
-              <a:t>Train/Test/Validation Sets:</a:t>
-            </a:r>
-          </a:p>
-          <a:p>
-            <a:pPr lvl="1"/>
-            <a:r>
-              <a:rPr lang="en-US" dirty="0"/>
-              <a:t>Train: Data used to update model parameters.</a:t>
-            </a:r>
-          </a:p>
-          <a:p>
-            <a:pPr lvl="1"/>
-            <a:r>
-              <a:rPr lang="en-US" dirty="0"/>
-              <a:t>Test: Data used to update model hyper-</a:t>
-            </a:r>
-            <a:r>
-              <a:rPr lang="en-US" dirty="0" err="1"/>
-              <a:t>parmeters</a:t>
-            </a:r>
-            <a:r>
-              <a:rPr lang="en-US" dirty="0"/>
-              <a:t>.</a:t>
-            </a:r>
-          </a:p>
-          <a:p>
-            <a:pPr lvl="1"/>
-            <a:r>
-              <a:rPr lang="en-US" dirty="0"/>
-              <a:t>Validation: Data used to measure performance of selected model.</a:t>
-            </a:r>
-          </a:p>
-          <a:p>
-            <a:r>
-              <a:rPr lang="en-US" dirty="0"/>
-              <a:t>Training Vocabulary:</a:t>
-            </a:r>
-          </a:p>
-          <a:p>
-            <a:pPr lvl="1"/>
-            <a:r>
-              <a:rPr lang="en-US" dirty="0"/>
-              <a:t>Epoch – one full pass through test train set</a:t>
-            </a:r>
-          </a:p>
-          <a:p>
-            <a:pPr lvl="1"/>
-            <a:r>
-              <a:rPr lang="en-US" dirty="0"/>
-              <a:t>Batch Size – how many examples to evaluate at once. Typically, a </a:t>
-            </a:r>
-            <a:r>
-              <a:rPr lang="en-US" dirty="0" err="1"/>
-              <a:t>gradiant</a:t>
-            </a:r>
-            <a:r>
-              <a:rPr lang="en-US" dirty="0"/>
-              <a:t> is computed on this data.</a:t>
-            </a:r>
-          </a:p>
-          <a:p>
-            <a:pPr lvl="1"/>
-            <a:r>
-              <a:rPr lang="en-US" dirty="0"/>
-              <a:t>Loss – </a:t>
-            </a:r>
-            <a:r>
-              <a:rPr lang="en-US" i="1" dirty="0"/>
-              <a:t>differentiable</a:t>
-            </a:r>
-            <a:r>
-              <a:rPr lang="en-US" dirty="0"/>
-              <a:t> function comparing predictions and targets: model(x) vs y.</a:t>
-            </a:r>
-          </a:p>
-          <a:p>
-            <a:pPr lvl="1"/>
-            <a:r>
-              <a:rPr lang="en-US" dirty="0"/>
-              <a:t>Stochastic Gradient Descent (SGD) – the algorithm for efficiently updating model parameters by computing partial derivatives of loss(model(x), y) over a batch of samples.</a:t>
-            </a:r>
-          </a:p>
-          <a:p>
-            <a:endParaRPr lang="en-US" dirty="0"/>
+              <a:t>Switch to TLE Notebook</a:t>
+            </a:r>
           </a:p>
         </p:txBody>
       </p:sp>
     </p:spTree>
     <p:extLst>
       <p:ext uri="{BB962C8B-B14F-4D97-AF65-F5344CB8AC3E}">
-        <p14:creationId xmlns:p14="http://schemas.microsoft.com/office/powerpoint/2010/main" val="3459832265"/>
+        <p14:creationId xmlns:p14="http://schemas.microsoft.com/office/powerpoint/2010/main" val="2615263877"/>
       </p:ext>
     </p:extLst>
   </p:cSld>

</xml_diff>